<commit_message>
Finished Slide show 4 and fix user manual
</commit_message>
<xml_diff>
--- a/SRS/SlideShow4.pptx
+++ b/SRS/SlideShow4.pptx
@@ -113,7 +113,7 @@
   </p:defaultTextStyle>
   <p:extLst>
     <p:ext uri="{EFAFB233-063F-42B5-8137-9DF3F51BA10A}">
-      <p15:sldGuideLst xmlns:p15="http://schemas.microsoft.com/office/powerpoint/2012/main" xmlns="">
+      <p15:sldGuideLst xmlns="" xmlns:p15="http://schemas.microsoft.com/office/powerpoint/2012/main">
         <p15:guide id="1" orient="horz" pos="2160">
           <p15:clr>
             <a:srgbClr val="A4A3A4"/>
@@ -7725,10 +7725,10 @@
           <p:cNvPr id="8" name="Rectangle 7">
             <a:extLst>
               <a:ext uri="{FF2B5EF4-FFF2-40B4-BE49-F238E27FC236}">
-                <a16:creationId xmlns:a16="http://schemas.microsoft.com/office/drawing/2014/main" xmlns="" id="{F81819F9-8CAC-4A6C-8F06-0482027F9736}"/>
+                <a16:creationId xmlns="" xmlns:a16="http://schemas.microsoft.com/office/drawing/2014/main" id="{F81819F9-8CAC-4A6C-8F06-0482027F9736}"/>
               </a:ext>
               <a:ext uri="{C183D7F6-B498-43B3-948B-1728B52AA6E4}">
-                <adec:decorative xmlns:adec="http://schemas.microsoft.com/office/drawing/2017/decorative" xmlns="" val="1"/>
+                <adec:decorative xmlns="" xmlns:adec="http://schemas.microsoft.com/office/drawing/2017/decorative" val="1"/>
               </a:ext>
             </a:extLst>
           </p:cNvPr>
@@ -7738,7 +7738,7 @@
           <p:nvPr>
             <p:extLst>
               <p:ext uri="{386F3935-93C4-4BCD-93E2-E3B085C9AB24}">
-                <p16:designElem xmlns:p16="http://schemas.microsoft.com/office/powerpoint/2015/main" xmlns="" val="1"/>
+                <p16:designElem xmlns="" xmlns:p16="http://schemas.microsoft.com/office/powerpoint/2015/main" val="1"/>
               </p:ext>
             </p:extLst>
           </p:nvPr>
@@ -7785,7 +7785,7 @@
           <p:cNvPr id="2" name="Title 1">
             <a:extLst>
               <a:ext uri="{FF2B5EF4-FFF2-40B4-BE49-F238E27FC236}">
-                <a16:creationId xmlns:a16="http://schemas.microsoft.com/office/drawing/2014/main" xmlns="" id="{ACCA312D-3828-4024-9CA0-545EE469B88F}"/>
+                <a16:creationId xmlns="" xmlns:a16="http://schemas.microsoft.com/office/drawing/2014/main" id="{ACCA312D-3828-4024-9CA0-545EE469B88F}"/>
               </a:ext>
             </a:extLst>
           </p:cNvPr>
@@ -7872,7 +7872,7 @@
           <p:cNvPr id="3" name="Subtitle 2">
             <a:extLst>
               <a:ext uri="{FF2B5EF4-FFF2-40B4-BE49-F238E27FC236}">
-                <a16:creationId xmlns:a16="http://schemas.microsoft.com/office/drawing/2014/main" xmlns="" id="{C7503EA1-3526-455A-926A-3FC10C2110C2}"/>
+                <a16:creationId xmlns="" xmlns:a16="http://schemas.microsoft.com/office/drawing/2014/main" id="{C7503EA1-3526-455A-926A-3FC10C2110C2}"/>
               </a:ext>
             </a:extLst>
           </p:cNvPr>
@@ -7917,10 +7917,10 @@
           <p:cNvPr id="10" name="Rectangle 9">
             <a:extLst>
               <a:ext uri="{FF2B5EF4-FFF2-40B4-BE49-F238E27FC236}">
-                <a16:creationId xmlns:a16="http://schemas.microsoft.com/office/drawing/2014/main" xmlns="" id="{4A98CC08-AEC2-4E8F-8F52-0F5C6372DB4F}"/>
+                <a16:creationId xmlns="" xmlns:a16="http://schemas.microsoft.com/office/drawing/2014/main" id="{4A98CC08-AEC2-4E8F-8F52-0F5C6372DB4F}"/>
               </a:ext>
               <a:ext uri="{C183D7F6-B498-43B3-948B-1728B52AA6E4}">
-                <adec:decorative xmlns:adec="http://schemas.microsoft.com/office/drawing/2017/decorative" xmlns="" val="1"/>
+                <adec:decorative xmlns="" xmlns:adec="http://schemas.microsoft.com/office/drawing/2017/decorative" val="1"/>
               </a:ext>
             </a:extLst>
           </p:cNvPr>
@@ -7930,7 +7930,7 @@
           <p:nvPr>
             <p:extLst>
               <p:ext uri="{386F3935-93C4-4BCD-93E2-E3B085C9AB24}">
-                <p16:designElem xmlns:p16="http://schemas.microsoft.com/office/powerpoint/2015/main" xmlns="" val="1"/>
+                <p16:designElem xmlns="" xmlns:p16="http://schemas.microsoft.com/office/powerpoint/2015/main" val="1"/>
               </p:ext>
             </p:extLst>
           </p:nvPr>
@@ -7980,10 +7980,10 @@
           <p:cNvPr id="12" name="Group 11">
             <a:extLst>
               <a:ext uri="{FF2B5EF4-FFF2-40B4-BE49-F238E27FC236}">
-                <a16:creationId xmlns:a16="http://schemas.microsoft.com/office/drawing/2014/main" xmlns="" id="{5D1545E6-EB3C-4478-A661-A2CA963F129C}"/>
+                <a16:creationId xmlns="" xmlns:a16="http://schemas.microsoft.com/office/drawing/2014/main" id="{5D1545E6-EB3C-4478-A661-A2CA963F129C}"/>
               </a:ext>
               <a:ext uri="{C183D7F6-B498-43B3-948B-1728B52AA6E4}">
-                <adec:decorative xmlns:adec="http://schemas.microsoft.com/office/drawing/2017/decorative" xmlns="" val="1"/>
+                <adec:decorative xmlns="" xmlns:adec="http://schemas.microsoft.com/office/drawing/2017/decorative" val="1"/>
               </a:ext>
             </a:extLst>
           </p:cNvPr>
@@ -7993,7 +7993,7 @@
           <p:nvPr>
             <p:extLst>
               <p:ext uri="{386F3935-93C4-4BCD-93E2-E3B085C9AB24}">
-                <p16:designElem xmlns:p16="http://schemas.microsoft.com/office/powerpoint/2015/main" xmlns="" val="1"/>
+                <p16:designElem xmlns="" xmlns:p16="http://schemas.microsoft.com/office/powerpoint/2015/main" val="1"/>
               </p:ext>
             </p:extLst>
           </p:nvPr>
@@ -8018,10 +8018,10 @@
             <p:cNvPr id="13" name="Freeform 11">
               <a:extLst>
                 <a:ext uri="{FF2B5EF4-FFF2-40B4-BE49-F238E27FC236}">
-                  <a16:creationId xmlns:a16="http://schemas.microsoft.com/office/drawing/2014/main" xmlns="" id="{B2E5B960-0C5D-4F77-8E9F-9F3D883D83C5}"/>
+                  <a16:creationId xmlns="" xmlns:a16="http://schemas.microsoft.com/office/drawing/2014/main" id="{B2E5B960-0C5D-4F77-8E9F-9F3D883D83C5}"/>
                 </a:ext>
                 <a:ext uri="{C183D7F6-B498-43B3-948B-1728B52AA6E4}">
-                  <adec:decorative xmlns:adec="http://schemas.microsoft.com/office/drawing/2017/decorative" xmlns="" val="1"/>
+                  <adec:decorative xmlns="" xmlns:adec="http://schemas.microsoft.com/office/drawing/2017/decorative" val="1"/>
                 </a:ext>
               </a:extLst>
             </p:cNvPr>
@@ -8029,7 +8029,7 @@
             <p:nvPr>
               <p:extLst>
                 <p:ext uri="{386F3935-93C4-4BCD-93E2-E3B085C9AB24}">
-                  <p16:designElem xmlns:p16="http://schemas.microsoft.com/office/powerpoint/2015/main" xmlns="" val="1"/>
+                  <p16:designElem xmlns="" xmlns:p16="http://schemas.microsoft.com/office/powerpoint/2015/main" val="1"/>
                 </p:ext>
               </p:extLst>
             </p:nvPr>
@@ -8090,10 +8090,10 @@
             <p:cNvPr id="14" name="Freeform 12">
               <a:extLst>
                 <a:ext uri="{FF2B5EF4-FFF2-40B4-BE49-F238E27FC236}">
-                  <a16:creationId xmlns:a16="http://schemas.microsoft.com/office/drawing/2014/main" xmlns="" id="{258E44FC-92AD-43A0-BB05-DB268C82D8B2}"/>
+                  <a16:creationId xmlns="" xmlns:a16="http://schemas.microsoft.com/office/drawing/2014/main" id="{258E44FC-92AD-43A0-BB05-DB268C82D8B2}"/>
                 </a:ext>
                 <a:ext uri="{C183D7F6-B498-43B3-948B-1728B52AA6E4}">
-                  <adec:decorative xmlns:adec="http://schemas.microsoft.com/office/drawing/2017/decorative" xmlns="" val="1"/>
+                  <adec:decorative xmlns="" xmlns:adec="http://schemas.microsoft.com/office/drawing/2017/decorative" val="1"/>
                 </a:ext>
               </a:extLst>
             </p:cNvPr>
@@ -8101,7 +8101,7 @@
             <p:nvPr>
               <p:extLst>
                 <p:ext uri="{386F3935-93C4-4BCD-93E2-E3B085C9AB24}">
-                  <p16:designElem xmlns:p16="http://schemas.microsoft.com/office/powerpoint/2015/main" xmlns="" val="1"/>
+                  <p16:designElem xmlns="" xmlns:p16="http://schemas.microsoft.com/office/powerpoint/2015/main" val="1"/>
                 </p:ext>
               </p:extLst>
             </p:nvPr>
@@ -8167,10 +8167,10 @@
             <p:cNvPr id="15" name="Freeform 13">
               <a:extLst>
                 <a:ext uri="{FF2B5EF4-FFF2-40B4-BE49-F238E27FC236}">
-                  <a16:creationId xmlns:a16="http://schemas.microsoft.com/office/drawing/2014/main" xmlns="" id="{C63D3083-A56C-4199-8DE0-63C8BE9EDFE9}"/>
+                  <a16:creationId xmlns="" xmlns:a16="http://schemas.microsoft.com/office/drawing/2014/main" id="{C63D3083-A56C-4199-8DE0-63C8BE9EDFE9}"/>
                 </a:ext>
                 <a:ext uri="{C183D7F6-B498-43B3-948B-1728B52AA6E4}">
-                  <adec:decorative xmlns:adec="http://schemas.microsoft.com/office/drawing/2017/decorative" xmlns="" val="1"/>
+                  <adec:decorative xmlns="" xmlns:adec="http://schemas.microsoft.com/office/drawing/2017/decorative" val="1"/>
                 </a:ext>
               </a:extLst>
             </p:cNvPr>
@@ -8178,7 +8178,7 @@
             <p:nvPr>
               <p:extLst>
                 <p:ext uri="{386F3935-93C4-4BCD-93E2-E3B085C9AB24}">
-                  <p16:designElem xmlns:p16="http://schemas.microsoft.com/office/powerpoint/2015/main" xmlns="" val="1"/>
+                  <p16:designElem xmlns="" xmlns:p16="http://schemas.microsoft.com/office/powerpoint/2015/main" val="1"/>
                 </p:ext>
               </p:extLst>
             </p:nvPr>
@@ -8249,10 +8249,10 @@
             <p:cNvPr id="16" name="Freeform 14">
               <a:extLst>
                 <a:ext uri="{FF2B5EF4-FFF2-40B4-BE49-F238E27FC236}">
-                  <a16:creationId xmlns:a16="http://schemas.microsoft.com/office/drawing/2014/main" xmlns="" id="{C7CD3581-635D-438F-A64F-68404E7AE0B8}"/>
+                  <a16:creationId xmlns="" xmlns:a16="http://schemas.microsoft.com/office/drawing/2014/main" id="{C7CD3581-635D-438F-A64F-68404E7AE0B8}"/>
                 </a:ext>
                 <a:ext uri="{C183D7F6-B498-43B3-948B-1728B52AA6E4}">
-                  <adec:decorative xmlns:adec="http://schemas.microsoft.com/office/drawing/2017/decorative" xmlns="" val="1"/>
+                  <adec:decorative xmlns="" xmlns:adec="http://schemas.microsoft.com/office/drawing/2017/decorative" val="1"/>
                 </a:ext>
               </a:extLst>
             </p:cNvPr>
@@ -8260,7 +8260,7 @@
             <p:nvPr>
               <p:extLst>
                 <p:ext uri="{386F3935-93C4-4BCD-93E2-E3B085C9AB24}">
-                  <p16:designElem xmlns:p16="http://schemas.microsoft.com/office/powerpoint/2015/main" xmlns="" val="1"/>
+                  <p16:designElem xmlns="" xmlns:p16="http://schemas.microsoft.com/office/powerpoint/2015/main" val="1"/>
                 </p:ext>
               </p:extLst>
             </p:nvPr>
@@ -8311,10 +8311,10 @@
             <p:cNvPr id="17" name="Freeform 15">
               <a:extLst>
                 <a:ext uri="{FF2B5EF4-FFF2-40B4-BE49-F238E27FC236}">
-                  <a16:creationId xmlns:a16="http://schemas.microsoft.com/office/drawing/2014/main" xmlns="" id="{AD6904C0-211C-41A2-BDB8-3B07C90BBB4C}"/>
+                  <a16:creationId xmlns="" xmlns:a16="http://schemas.microsoft.com/office/drawing/2014/main" id="{AD6904C0-211C-41A2-BDB8-3B07C90BBB4C}"/>
                 </a:ext>
                 <a:ext uri="{C183D7F6-B498-43B3-948B-1728B52AA6E4}">
-                  <adec:decorative xmlns:adec="http://schemas.microsoft.com/office/drawing/2017/decorative" xmlns="" val="1"/>
+                  <adec:decorative xmlns="" xmlns:adec="http://schemas.microsoft.com/office/drawing/2017/decorative" val="1"/>
                 </a:ext>
               </a:extLst>
             </p:cNvPr>
@@ -8322,7 +8322,7 @@
             <p:nvPr>
               <p:extLst>
                 <p:ext uri="{386F3935-93C4-4BCD-93E2-E3B085C9AB24}">
-                  <p16:designElem xmlns:p16="http://schemas.microsoft.com/office/powerpoint/2015/main" xmlns="" val="1"/>
+                  <p16:designElem xmlns="" xmlns:p16="http://schemas.microsoft.com/office/powerpoint/2015/main" val="1"/>
                 </p:ext>
               </p:extLst>
             </p:nvPr>
@@ -8408,10 +8408,10 @@
             <p:cNvPr id="18" name="Freeform 16">
               <a:extLst>
                 <a:ext uri="{FF2B5EF4-FFF2-40B4-BE49-F238E27FC236}">
-                  <a16:creationId xmlns:a16="http://schemas.microsoft.com/office/drawing/2014/main" xmlns="" id="{B0837DA6-CAF9-4E78-A39E-6358EDE2B108}"/>
+                  <a16:creationId xmlns="" xmlns:a16="http://schemas.microsoft.com/office/drawing/2014/main" id="{B0837DA6-CAF9-4E78-A39E-6358EDE2B108}"/>
                 </a:ext>
                 <a:ext uri="{C183D7F6-B498-43B3-948B-1728B52AA6E4}">
-                  <adec:decorative xmlns:adec="http://schemas.microsoft.com/office/drawing/2017/decorative" xmlns="" val="1"/>
+                  <adec:decorative xmlns="" xmlns:adec="http://schemas.microsoft.com/office/drawing/2017/decorative" val="1"/>
                 </a:ext>
               </a:extLst>
             </p:cNvPr>
@@ -8419,7 +8419,7 @@
             <p:nvPr>
               <p:extLst>
                 <p:ext uri="{386F3935-93C4-4BCD-93E2-E3B085C9AB24}">
-                  <p16:designElem xmlns:p16="http://schemas.microsoft.com/office/powerpoint/2015/main" xmlns="" val="1"/>
+                  <p16:designElem xmlns="" xmlns:p16="http://schemas.microsoft.com/office/powerpoint/2015/main" val="1"/>
                 </p:ext>
               </p:extLst>
             </p:nvPr>
@@ -8500,10 +8500,10 @@
             <p:cNvPr id="19" name="Freeform 17">
               <a:extLst>
                 <a:ext uri="{FF2B5EF4-FFF2-40B4-BE49-F238E27FC236}">
-                  <a16:creationId xmlns:a16="http://schemas.microsoft.com/office/drawing/2014/main" xmlns="" id="{0A99DD7D-3AB3-471E-842F-8AFEA09D07E4}"/>
+                  <a16:creationId xmlns="" xmlns:a16="http://schemas.microsoft.com/office/drawing/2014/main" id="{0A99DD7D-3AB3-471E-842F-8AFEA09D07E4}"/>
                 </a:ext>
                 <a:ext uri="{C183D7F6-B498-43B3-948B-1728B52AA6E4}">
-                  <adec:decorative xmlns:adec="http://schemas.microsoft.com/office/drawing/2017/decorative" xmlns="" val="1"/>
+                  <adec:decorative xmlns="" xmlns:adec="http://schemas.microsoft.com/office/drawing/2017/decorative" val="1"/>
                 </a:ext>
               </a:extLst>
             </p:cNvPr>
@@ -8511,7 +8511,7 @@
             <p:nvPr>
               <p:extLst>
                 <p:ext uri="{386F3935-93C4-4BCD-93E2-E3B085C9AB24}">
-                  <p16:designElem xmlns:p16="http://schemas.microsoft.com/office/powerpoint/2015/main" xmlns="" val="1"/>
+                  <p16:designElem xmlns="" xmlns:p16="http://schemas.microsoft.com/office/powerpoint/2015/main" val="1"/>
                 </p:ext>
               </p:extLst>
             </p:nvPr>
@@ -8572,10 +8572,10 @@
             <p:cNvPr id="20" name="Freeform 18">
               <a:extLst>
                 <a:ext uri="{FF2B5EF4-FFF2-40B4-BE49-F238E27FC236}">
-                  <a16:creationId xmlns:a16="http://schemas.microsoft.com/office/drawing/2014/main" xmlns="" id="{9C70B0D4-92FE-478F-86BD-93BA2C4DFCDC}"/>
+                  <a16:creationId xmlns="" xmlns:a16="http://schemas.microsoft.com/office/drawing/2014/main" id="{9C70B0D4-92FE-478F-86BD-93BA2C4DFCDC}"/>
                 </a:ext>
                 <a:ext uri="{C183D7F6-B498-43B3-948B-1728B52AA6E4}">
-                  <adec:decorative xmlns:adec="http://schemas.microsoft.com/office/drawing/2017/decorative" xmlns="" val="1"/>
+                  <adec:decorative xmlns="" xmlns:adec="http://schemas.microsoft.com/office/drawing/2017/decorative" val="1"/>
                 </a:ext>
               </a:extLst>
             </p:cNvPr>
@@ -8583,7 +8583,7 @@
             <p:nvPr>
               <p:extLst>
                 <p:ext uri="{386F3935-93C4-4BCD-93E2-E3B085C9AB24}">
-                  <p16:designElem xmlns:p16="http://schemas.microsoft.com/office/powerpoint/2015/main" xmlns="" val="1"/>
+                  <p16:designElem xmlns="" xmlns:p16="http://schemas.microsoft.com/office/powerpoint/2015/main" val="1"/>
                 </p:ext>
               </p:extLst>
             </p:nvPr>
@@ -8664,10 +8664,10 @@
             <p:cNvPr id="21" name="Freeform 19">
               <a:extLst>
                 <a:ext uri="{FF2B5EF4-FFF2-40B4-BE49-F238E27FC236}">
-                  <a16:creationId xmlns:a16="http://schemas.microsoft.com/office/drawing/2014/main" xmlns="" id="{C9156BE6-11D4-4696-9E3F-C325BFAC8196}"/>
+                  <a16:creationId xmlns="" xmlns:a16="http://schemas.microsoft.com/office/drawing/2014/main" id="{C9156BE6-11D4-4696-9E3F-C325BFAC8196}"/>
                 </a:ext>
                 <a:ext uri="{C183D7F6-B498-43B3-948B-1728B52AA6E4}">
-                  <adec:decorative xmlns:adec="http://schemas.microsoft.com/office/drawing/2017/decorative" xmlns="" val="1"/>
+                  <adec:decorative xmlns="" xmlns:adec="http://schemas.microsoft.com/office/drawing/2017/decorative" val="1"/>
                 </a:ext>
               </a:extLst>
             </p:cNvPr>
@@ -8675,7 +8675,7 @@
             <p:nvPr>
               <p:extLst>
                 <p:ext uri="{386F3935-93C4-4BCD-93E2-E3B085C9AB24}">
-                  <p16:designElem xmlns:p16="http://schemas.microsoft.com/office/powerpoint/2015/main" xmlns="" val="1"/>
+                  <p16:designElem xmlns="" xmlns:p16="http://schemas.microsoft.com/office/powerpoint/2015/main" val="1"/>
                 </p:ext>
               </p:extLst>
             </p:nvPr>
@@ -8791,10 +8791,10 @@
             <p:cNvPr id="22" name="Freeform 20">
               <a:extLst>
                 <a:ext uri="{FF2B5EF4-FFF2-40B4-BE49-F238E27FC236}">
-                  <a16:creationId xmlns:a16="http://schemas.microsoft.com/office/drawing/2014/main" xmlns="" id="{4E667226-1D20-4A9D-BBE3-AC17EA436F05}"/>
+                  <a16:creationId xmlns="" xmlns:a16="http://schemas.microsoft.com/office/drawing/2014/main" id="{4E667226-1D20-4A9D-BBE3-AC17EA436F05}"/>
                 </a:ext>
                 <a:ext uri="{C183D7F6-B498-43B3-948B-1728B52AA6E4}">
-                  <adec:decorative xmlns:adec="http://schemas.microsoft.com/office/drawing/2017/decorative" xmlns="" val="1"/>
+                  <adec:decorative xmlns="" xmlns:adec="http://schemas.microsoft.com/office/drawing/2017/decorative" val="1"/>
                 </a:ext>
               </a:extLst>
             </p:cNvPr>
@@ -8802,7 +8802,7 @@
             <p:nvPr>
               <p:extLst>
                 <p:ext uri="{386F3935-93C4-4BCD-93E2-E3B085C9AB24}">
-                  <p16:designElem xmlns:p16="http://schemas.microsoft.com/office/powerpoint/2015/main" xmlns="" val="1"/>
+                  <p16:designElem xmlns="" xmlns:p16="http://schemas.microsoft.com/office/powerpoint/2015/main" val="1"/>
                 </p:ext>
               </p:extLst>
             </p:nvPr>
@@ -8853,10 +8853,10 @@
             <p:cNvPr id="23" name="Freeform 21">
               <a:extLst>
                 <a:ext uri="{FF2B5EF4-FFF2-40B4-BE49-F238E27FC236}">
-                  <a16:creationId xmlns:a16="http://schemas.microsoft.com/office/drawing/2014/main" xmlns="" id="{2F87E3B6-5202-4434-9B26-42B46774F327}"/>
+                  <a16:creationId xmlns="" xmlns:a16="http://schemas.microsoft.com/office/drawing/2014/main" id="{2F87E3B6-5202-4434-9B26-42B46774F327}"/>
                 </a:ext>
                 <a:ext uri="{C183D7F6-B498-43B3-948B-1728B52AA6E4}">
-                  <adec:decorative xmlns:adec="http://schemas.microsoft.com/office/drawing/2017/decorative" xmlns="" val="1"/>
+                  <adec:decorative xmlns="" xmlns:adec="http://schemas.microsoft.com/office/drawing/2017/decorative" val="1"/>
                 </a:ext>
               </a:extLst>
             </p:cNvPr>
@@ -8864,7 +8864,7 @@
             <p:nvPr>
               <p:extLst>
                 <p:ext uri="{386F3935-93C4-4BCD-93E2-E3B085C9AB24}">
-                  <p16:designElem xmlns:p16="http://schemas.microsoft.com/office/powerpoint/2015/main" xmlns="" val="1"/>
+                  <p16:designElem xmlns="" xmlns:p16="http://schemas.microsoft.com/office/powerpoint/2015/main" val="1"/>
                 </p:ext>
               </p:extLst>
             </p:nvPr>
@@ -8925,10 +8925,10 @@
             <p:cNvPr id="24" name="Freeform 22">
               <a:extLst>
                 <a:ext uri="{FF2B5EF4-FFF2-40B4-BE49-F238E27FC236}">
-                  <a16:creationId xmlns:a16="http://schemas.microsoft.com/office/drawing/2014/main" xmlns="" id="{AEA5E85F-F1F4-40E4-A62C-95324F674929}"/>
+                  <a16:creationId xmlns="" xmlns:a16="http://schemas.microsoft.com/office/drawing/2014/main" id="{AEA5E85F-F1F4-40E4-A62C-95324F674929}"/>
                 </a:ext>
                 <a:ext uri="{C183D7F6-B498-43B3-948B-1728B52AA6E4}">
-                  <adec:decorative xmlns:adec="http://schemas.microsoft.com/office/drawing/2017/decorative" xmlns="" val="1"/>
+                  <adec:decorative xmlns="" xmlns:adec="http://schemas.microsoft.com/office/drawing/2017/decorative" val="1"/>
                 </a:ext>
               </a:extLst>
             </p:cNvPr>
@@ -8936,7 +8936,7 @@
             <p:nvPr>
               <p:extLst>
                 <p:ext uri="{386F3935-93C4-4BCD-93E2-E3B085C9AB24}">
-                  <p16:designElem xmlns:p16="http://schemas.microsoft.com/office/powerpoint/2015/main" xmlns="" val="1"/>
+                  <p16:designElem xmlns="" xmlns:p16="http://schemas.microsoft.com/office/powerpoint/2015/main" val="1"/>
                 </p:ext>
               </p:extLst>
             </p:nvPr>
@@ -9008,10 +9008,10 @@
           <p:cNvPr id="26" name="Group 25">
             <a:extLst>
               <a:ext uri="{FF2B5EF4-FFF2-40B4-BE49-F238E27FC236}">
-                <a16:creationId xmlns:a16="http://schemas.microsoft.com/office/drawing/2014/main" xmlns="" id="{40A75861-F6C5-44A9-B161-B03701CBDE0C}"/>
+                <a16:creationId xmlns="" xmlns:a16="http://schemas.microsoft.com/office/drawing/2014/main" id="{40A75861-F6C5-44A9-B161-B03701CBDE0C}"/>
               </a:ext>
               <a:ext uri="{C183D7F6-B498-43B3-948B-1728B52AA6E4}">
-                <adec:decorative xmlns:adec="http://schemas.microsoft.com/office/drawing/2017/decorative" xmlns="" val="1"/>
+                <adec:decorative xmlns="" xmlns:adec="http://schemas.microsoft.com/office/drawing/2017/decorative" val="1"/>
               </a:ext>
             </a:extLst>
           </p:cNvPr>
@@ -9021,7 +9021,7 @@
           <p:nvPr>
             <p:extLst>
               <p:ext uri="{386F3935-93C4-4BCD-93E2-E3B085C9AB24}">
-                <p16:designElem xmlns:p16="http://schemas.microsoft.com/office/powerpoint/2015/main" xmlns="" val="1"/>
+                <p16:designElem xmlns="" xmlns:p16="http://schemas.microsoft.com/office/powerpoint/2015/main" val="1"/>
               </p:ext>
             </p:extLst>
           </p:nvPr>
@@ -9045,10 +9045,10 @@
             <p:cNvPr id="27" name="Freeform 27">
               <a:extLst>
                 <a:ext uri="{FF2B5EF4-FFF2-40B4-BE49-F238E27FC236}">
-                  <a16:creationId xmlns:a16="http://schemas.microsoft.com/office/drawing/2014/main" xmlns="" id="{72EE642D-4F69-47C0-99BA-CE435035735F}"/>
+                  <a16:creationId xmlns="" xmlns:a16="http://schemas.microsoft.com/office/drawing/2014/main" id="{72EE642D-4F69-47C0-99BA-CE435035735F}"/>
                 </a:ext>
                 <a:ext uri="{C183D7F6-B498-43B3-948B-1728B52AA6E4}">
-                  <adec:decorative xmlns:adec="http://schemas.microsoft.com/office/drawing/2017/decorative" xmlns="" val="1"/>
+                  <adec:decorative xmlns="" xmlns:adec="http://schemas.microsoft.com/office/drawing/2017/decorative" val="1"/>
                 </a:ext>
               </a:extLst>
             </p:cNvPr>
@@ -9056,7 +9056,7 @@
             <p:nvPr>
               <p:extLst>
                 <p:ext uri="{386F3935-93C4-4BCD-93E2-E3B085C9AB24}">
-                  <p16:designElem xmlns:p16="http://schemas.microsoft.com/office/powerpoint/2015/main" xmlns="" val="1"/>
+                  <p16:designElem xmlns="" xmlns:p16="http://schemas.microsoft.com/office/powerpoint/2015/main" val="1"/>
                 </p:ext>
               </p:extLst>
             </p:nvPr>
@@ -9162,10 +9162,10 @@
             <p:cNvPr id="28" name="Freeform 28">
               <a:extLst>
                 <a:ext uri="{FF2B5EF4-FFF2-40B4-BE49-F238E27FC236}">
-                  <a16:creationId xmlns:a16="http://schemas.microsoft.com/office/drawing/2014/main" xmlns="" id="{26178CE4-DA2D-46EA-AB8D-341C5AC563D6}"/>
+                  <a16:creationId xmlns="" xmlns:a16="http://schemas.microsoft.com/office/drawing/2014/main" id="{26178CE4-DA2D-46EA-AB8D-341C5AC563D6}"/>
                 </a:ext>
                 <a:ext uri="{C183D7F6-B498-43B3-948B-1728B52AA6E4}">
-                  <adec:decorative xmlns:adec="http://schemas.microsoft.com/office/drawing/2017/decorative" xmlns="" val="1"/>
+                  <adec:decorative xmlns="" xmlns:adec="http://schemas.microsoft.com/office/drawing/2017/decorative" val="1"/>
                 </a:ext>
               </a:extLst>
             </p:cNvPr>
@@ -9173,7 +9173,7 @@
             <p:nvPr>
               <p:extLst>
                 <p:ext uri="{386F3935-93C4-4BCD-93E2-E3B085C9AB24}">
-                  <p16:designElem xmlns:p16="http://schemas.microsoft.com/office/powerpoint/2015/main" xmlns="" val="1"/>
+                  <p16:designElem xmlns="" xmlns:p16="http://schemas.microsoft.com/office/powerpoint/2015/main" val="1"/>
                 </p:ext>
               </p:extLst>
             </p:nvPr>
@@ -9244,10 +9244,10 @@
             <p:cNvPr id="29" name="Freeform 29">
               <a:extLst>
                 <a:ext uri="{FF2B5EF4-FFF2-40B4-BE49-F238E27FC236}">
-                  <a16:creationId xmlns:a16="http://schemas.microsoft.com/office/drawing/2014/main" xmlns="" id="{698E9F53-8381-4FA5-A510-846925D242CF}"/>
+                  <a16:creationId xmlns="" xmlns:a16="http://schemas.microsoft.com/office/drawing/2014/main" id="{698E9F53-8381-4FA5-A510-846925D242CF}"/>
                 </a:ext>
                 <a:ext uri="{C183D7F6-B498-43B3-948B-1728B52AA6E4}">
-                  <adec:decorative xmlns:adec="http://schemas.microsoft.com/office/drawing/2017/decorative" xmlns="" val="1"/>
+                  <adec:decorative xmlns="" xmlns:adec="http://schemas.microsoft.com/office/drawing/2017/decorative" val="1"/>
                 </a:ext>
               </a:extLst>
             </p:cNvPr>
@@ -9255,7 +9255,7 @@
             <p:nvPr>
               <p:extLst>
                 <p:ext uri="{386F3935-93C4-4BCD-93E2-E3B085C9AB24}">
-                  <p16:designElem xmlns:p16="http://schemas.microsoft.com/office/powerpoint/2015/main" xmlns="" val="1"/>
+                  <p16:designElem xmlns="" xmlns:p16="http://schemas.microsoft.com/office/powerpoint/2015/main" val="1"/>
                 </p:ext>
               </p:extLst>
             </p:nvPr>
@@ -9326,10 +9326,10 @@
             <p:cNvPr id="30" name="Freeform 30">
               <a:extLst>
                 <a:ext uri="{FF2B5EF4-FFF2-40B4-BE49-F238E27FC236}">
-                  <a16:creationId xmlns:a16="http://schemas.microsoft.com/office/drawing/2014/main" xmlns="" id="{B13CE284-F21E-411B-BB8E-9C03B853CE44}"/>
+                  <a16:creationId xmlns="" xmlns:a16="http://schemas.microsoft.com/office/drawing/2014/main" id="{B13CE284-F21E-411B-BB8E-9C03B853CE44}"/>
                 </a:ext>
                 <a:ext uri="{C183D7F6-B498-43B3-948B-1728B52AA6E4}">
-                  <adec:decorative xmlns:adec="http://schemas.microsoft.com/office/drawing/2017/decorative" xmlns="" val="1"/>
+                  <adec:decorative xmlns="" xmlns:adec="http://schemas.microsoft.com/office/drawing/2017/decorative" val="1"/>
                 </a:ext>
               </a:extLst>
             </p:cNvPr>
@@ -9337,7 +9337,7 @@
             <p:nvPr>
               <p:extLst>
                 <p:ext uri="{386F3935-93C4-4BCD-93E2-E3B085C9AB24}">
-                  <p16:designElem xmlns:p16="http://schemas.microsoft.com/office/powerpoint/2015/main" xmlns="" val="1"/>
+                  <p16:designElem xmlns="" xmlns:p16="http://schemas.microsoft.com/office/powerpoint/2015/main" val="1"/>
                 </p:ext>
               </p:extLst>
             </p:nvPr>
@@ -9423,10 +9423,10 @@
             <p:cNvPr id="31" name="Freeform 31">
               <a:extLst>
                 <a:ext uri="{FF2B5EF4-FFF2-40B4-BE49-F238E27FC236}">
-                  <a16:creationId xmlns:a16="http://schemas.microsoft.com/office/drawing/2014/main" xmlns="" id="{23DF4578-4703-437C-A797-2A2D0CEE5F45}"/>
+                  <a16:creationId xmlns="" xmlns:a16="http://schemas.microsoft.com/office/drawing/2014/main" id="{23DF4578-4703-437C-A797-2A2D0CEE5F45}"/>
                 </a:ext>
                 <a:ext uri="{C183D7F6-B498-43B3-948B-1728B52AA6E4}">
-                  <adec:decorative xmlns:adec="http://schemas.microsoft.com/office/drawing/2017/decorative" xmlns="" val="1"/>
+                  <adec:decorative xmlns="" xmlns:adec="http://schemas.microsoft.com/office/drawing/2017/decorative" val="1"/>
                 </a:ext>
               </a:extLst>
             </p:cNvPr>
@@ -9434,7 +9434,7 @@
             <p:nvPr>
               <p:extLst>
                 <p:ext uri="{386F3935-93C4-4BCD-93E2-E3B085C9AB24}">
-                  <p16:designElem xmlns:p16="http://schemas.microsoft.com/office/powerpoint/2015/main" xmlns="" val="1"/>
+                  <p16:designElem xmlns="" xmlns:p16="http://schemas.microsoft.com/office/powerpoint/2015/main" val="1"/>
                 </p:ext>
               </p:extLst>
             </p:nvPr>
@@ -9530,10 +9530,10 @@
             <p:cNvPr id="32" name="Freeform 32">
               <a:extLst>
                 <a:ext uri="{FF2B5EF4-FFF2-40B4-BE49-F238E27FC236}">
-                  <a16:creationId xmlns:a16="http://schemas.microsoft.com/office/drawing/2014/main" xmlns="" id="{F878F330-AF64-4F8F-88FD-A4A408D6D368}"/>
+                  <a16:creationId xmlns="" xmlns:a16="http://schemas.microsoft.com/office/drawing/2014/main" id="{F878F330-AF64-4F8F-88FD-A4A408D6D368}"/>
                 </a:ext>
                 <a:ext uri="{C183D7F6-B498-43B3-948B-1728B52AA6E4}">
-                  <adec:decorative xmlns:adec="http://schemas.microsoft.com/office/drawing/2017/decorative" xmlns="" val="1"/>
+                  <adec:decorative xmlns="" xmlns:adec="http://schemas.microsoft.com/office/drawing/2017/decorative" val="1"/>
                 </a:ext>
               </a:extLst>
             </p:cNvPr>
@@ -9541,7 +9541,7 @@
             <p:nvPr>
               <p:extLst>
                 <p:ext uri="{386F3935-93C4-4BCD-93E2-E3B085C9AB24}">
-                  <p16:designElem xmlns:p16="http://schemas.microsoft.com/office/powerpoint/2015/main" xmlns="" val="1"/>
+                  <p16:designElem xmlns="" xmlns:p16="http://schemas.microsoft.com/office/powerpoint/2015/main" val="1"/>
                 </p:ext>
               </p:extLst>
             </p:nvPr>
@@ -9592,10 +9592,10 @@
             <p:cNvPr id="33" name="Freeform 33">
               <a:extLst>
                 <a:ext uri="{FF2B5EF4-FFF2-40B4-BE49-F238E27FC236}">
-                  <a16:creationId xmlns:a16="http://schemas.microsoft.com/office/drawing/2014/main" xmlns="" id="{AC9B00BF-4FB7-42FA-BBBD-7DB54ED3F061}"/>
+                  <a16:creationId xmlns="" xmlns:a16="http://schemas.microsoft.com/office/drawing/2014/main" id="{AC9B00BF-4FB7-42FA-BBBD-7DB54ED3F061}"/>
                 </a:ext>
                 <a:ext uri="{C183D7F6-B498-43B3-948B-1728B52AA6E4}">
-                  <adec:decorative xmlns:adec="http://schemas.microsoft.com/office/drawing/2017/decorative" xmlns="" val="1"/>
+                  <adec:decorative xmlns="" xmlns:adec="http://schemas.microsoft.com/office/drawing/2017/decorative" val="1"/>
                 </a:ext>
               </a:extLst>
             </p:cNvPr>
@@ -9603,7 +9603,7 @@
             <p:nvPr>
               <p:extLst>
                 <p:ext uri="{386F3935-93C4-4BCD-93E2-E3B085C9AB24}">
-                  <p16:designElem xmlns:p16="http://schemas.microsoft.com/office/powerpoint/2015/main" xmlns="" val="1"/>
+                  <p16:designElem xmlns="" xmlns:p16="http://schemas.microsoft.com/office/powerpoint/2015/main" val="1"/>
                 </p:ext>
               </p:extLst>
             </p:nvPr>
@@ -9669,10 +9669,10 @@
             <p:cNvPr id="34" name="Freeform 34">
               <a:extLst>
                 <a:ext uri="{FF2B5EF4-FFF2-40B4-BE49-F238E27FC236}">
-                  <a16:creationId xmlns:a16="http://schemas.microsoft.com/office/drawing/2014/main" xmlns="" id="{BD3D64CA-2AAD-4609-8DAA-3EAD4609A6B1}"/>
+                  <a16:creationId xmlns="" xmlns:a16="http://schemas.microsoft.com/office/drawing/2014/main" id="{BD3D64CA-2AAD-4609-8DAA-3EAD4609A6B1}"/>
                 </a:ext>
                 <a:ext uri="{C183D7F6-B498-43B3-948B-1728B52AA6E4}">
-                  <adec:decorative xmlns:adec="http://schemas.microsoft.com/office/drawing/2017/decorative" xmlns="" val="1"/>
+                  <adec:decorative xmlns="" xmlns:adec="http://schemas.microsoft.com/office/drawing/2017/decorative" val="1"/>
                 </a:ext>
               </a:extLst>
             </p:cNvPr>
@@ -9680,7 +9680,7 @@
             <p:nvPr>
               <p:extLst>
                 <p:ext uri="{386F3935-93C4-4BCD-93E2-E3B085C9AB24}">
-                  <p16:designElem xmlns:p16="http://schemas.microsoft.com/office/powerpoint/2015/main" xmlns="" val="1"/>
+                  <p16:designElem xmlns="" xmlns:p16="http://schemas.microsoft.com/office/powerpoint/2015/main" val="1"/>
                 </p:ext>
               </p:extLst>
             </p:nvPr>
@@ -9791,10 +9791,10 @@
             <p:cNvPr id="35" name="Freeform 35">
               <a:extLst>
                 <a:ext uri="{FF2B5EF4-FFF2-40B4-BE49-F238E27FC236}">
-                  <a16:creationId xmlns:a16="http://schemas.microsoft.com/office/drawing/2014/main" xmlns="" id="{C669E05A-8550-4E91-B29E-E1912228EC93}"/>
+                  <a16:creationId xmlns="" xmlns:a16="http://schemas.microsoft.com/office/drawing/2014/main" id="{C669E05A-8550-4E91-B29E-E1912228EC93}"/>
                 </a:ext>
                 <a:ext uri="{C183D7F6-B498-43B3-948B-1728B52AA6E4}">
-                  <adec:decorative xmlns:adec="http://schemas.microsoft.com/office/drawing/2017/decorative" xmlns="" val="1"/>
+                  <adec:decorative xmlns="" xmlns:adec="http://schemas.microsoft.com/office/drawing/2017/decorative" val="1"/>
                 </a:ext>
               </a:extLst>
             </p:cNvPr>
@@ -9802,7 +9802,7 @@
             <p:nvPr>
               <p:extLst>
                 <p:ext uri="{386F3935-93C4-4BCD-93E2-E3B085C9AB24}">
-                  <p16:designElem xmlns:p16="http://schemas.microsoft.com/office/powerpoint/2015/main" xmlns="" val="1"/>
+                  <p16:designElem xmlns="" xmlns:p16="http://schemas.microsoft.com/office/powerpoint/2015/main" val="1"/>
                 </p:ext>
               </p:extLst>
             </p:nvPr>
@@ -9853,10 +9853,10 @@
             <p:cNvPr id="36" name="Freeform 36">
               <a:extLst>
                 <a:ext uri="{FF2B5EF4-FFF2-40B4-BE49-F238E27FC236}">
-                  <a16:creationId xmlns:a16="http://schemas.microsoft.com/office/drawing/2014/main" xmlns="" id="{F8C1FD53-1E8F-46CA-BC2D-FCEC4DAE07F6}"/>
+                  <a16:creationId xmlns="" xmlns:a16="http://schemas.microsoft.com/office/drawing/2014/main" id="{F8C1FD53-1E8F-46CA-BC2D-FCEC4DAE07F6}"/>
                 </a:ext>
                 <a:ext uri="{C183D7F6-B498-43B3-948B-1728B52AA6E4}">
-                  <adec:decorative xmlns:adec="http://schemas.microsoft.com/office/drawing/2017/decorative" xmlns="" val="1"/>
+                  <adec:decorative xmlns="" xmlns:adec="http://schemas.microsoft.com/office/drawing/2017/decorative" val="1"/>
                 </a:ext>
               </a:extLst>
             </p:cNvPr>
@@ -9864,7 +9864,7 @@
             <p:nvPr>
               <p:extLst>
                 <p:ext uri="{386F3935-93C4-4BCD-93E2-E3B085C9AB24}">
-                  <p16:designElem xmlns:p16="http://schemas.microsoft.com/office/powerpoint/2015/main" xmlns="" val="1"/>
+                  <p16:designElem xmlns="" xmlns:p16="http://schemas.microsoft.com/office/powerpoint/2015/main" val="1"/>
                 </p:ext>
               </p:extLst>
             </p:nvPr>
@@ -9935,10 +9935,10 @@
             <p:cNvPr id="37" name="Freeform 37">
               <a:extLst>
                 <a:ext uri="{FF2B5EF4-FFF2-40B4-BE49-F238E27FC236}">
-                  <a16:creationId xmlns:a16="http://schemas.microsoft.com/office/drawing/2014/main" xmlns="" id="{CC97A31F-CFDE-4EA3-98F1-13FDD16702E1}"/>
+                  <a16:creationId xmlns="" xmlns:a16="http://schemas.microsoft.com/office/drawing/2014/main" id="{CC97A31F-CFDE-4EA3-98F1-13FDD16702E1}"/>
                 </a:ext>
                 <a:ext uri="{C183D7F6-B498-43B3-948B-1728B52AA6E4}">
-                  <adec:decorative xmlns:adec="http://schemas.microsoft.com/office/drawing/2017/decorative" xmlns="" val="1"/>
+                  <adec:decorative xmlns="" xmlns:adec="http://schemas.microsoft.com/office/drawing/2017/decorative" val="1"/>
                 </a:ext>
               </a:extLst>
             </p:cNvPr>
@@ -9946,7 +9946,7 @@
             <p:nvPr>
               <p:extLst>
                 <p:ext uri="{386F3935-93C4-4BCD-93E2-E3B085C9AB24}">
-                  <p16:designElem xmlns:p16="http://schemas.microsoft.com/office/powerpoint/2015/main" xmlns="" val="1"/>
+                  <p16:designElem xmlns="" xmlns:p16="http://schemas.microsoft.com/office/powerpoint/2015/main" val="1"/>
                 </p:ext>
               </p:extLst>
             </p:nvPr>
@@ -10012,10 +10012,10 @@
             <p:cNvPr id="38" name="Freeform 38">
               <a:extLst>
                 <a:ext uri="{FF2B5EF4-FFF2-40B4-BE49-F238E27FC236}">
-                  <a16:creationId xmlns:a16="http://schemas.microsoft.com/office/drawing/2014/main" xmlns="" id="{9E1540E7-E6C3-4907-B70A-B17568365597}"/>
+                  <a16:creationId xmlns="" xmlns:a16="http://schemas.microsoft.com/office/drawing/2014/main" id="{9E1540E7-E6C3-4907-B70A-B17568365597}"/>
                 </a:ext>
                 <a:ext uri="{C183D7F6-B498-43B3-948B-1728B52AA6E4}">
-                  <adec:decorative xmlns:adec="http://schemas.microsoft.com/office/drawing/2017/decorative" xmlns="" val="1"/>
+                  <adec:decorative xmlns="" xmlns:adec="http://schemas.microsoft.com/office/drawing/2017/decorative" val="1"/>
                 </a:ext>
               </a:extLst>
             </p:cNvPr>
@@ -10023,7 +10023,7 @@
             <p:nvPr>
               <p:extLst>
                 <p:ext uri="{386F3935-93C4-4BCD-93E2-E3B085C9AB24}">
-                  <p16:designElem xmlns:p16="http://schemas.microsoft.com/office/powerpoint/2015/main" xmlns="" val="1"/>
+                  <p16:designElem xmlns="" xmlns:p16="http://schemas.microsoft.com/office/powerpoint/2015/main" val="1"/>
                 </p:ext>
               </p:extLst>
             </p:nvPr>
@@ -10095,10 +10095,10 @@
           <p:cNvPr id="40" name="Freeform 11">
             <a:extLst>
               <a:ext uri="{FF2B5EF4-FFF2-40B4-BE49-F238E27FC236}">
-                <a16:creationId xmlns:a16="http://schemas.microsoft.com/office/drawing/2014/main" xmlns="" id="{1310EFE2-B91D-47E7-B117-C2A802800A7C}"/>
+                <a16:creationId xmlns="" xmlns:a16="http://schemas.microsoft.com/office/drawing/2014/main" id="{1310EFE2-B91D-47E7-B117-C2A802800A7C}"/>
               </a:ext>
               <a:ext uri="{C183D7F6-B498-43B3-948B-1728B52AA6E4}">
-                <adec:decorative xmlns:adec="http://schemas.microsoft.com/office/drawing/2017/decorative" xmlns="" val="1"/>
+                <adec:decorative xmlns="" xmlns:adec="http://schemas.microsoft.com/office/drawing/2017/decorative" val="1"/>
               </a:ext>
             </a:extLst>
           </p:cNvPr>
@@ -10108,7 +10108,7 @@
           <p:nvPr>
             <p:extLst>
               <p:ext uri="{386F3935-93C4-4BCD-93E2-E3B085C9AB24}">
-                <p16:designElem xmlns:p16="http://schemas.microsoft.com/office/powerpoint/2015/main" xmlns="" val="1"/>
+                <p16:designElem xmlns="" xmlns:p16="http://schemas.microsoft.com/office/powerpoint/2015/main" val="1"/>
               </p:ext>
             </p:extLst>
           </p:nvPr>
@@ -10568,9 +10568,23 @@
             </a:r>
             <a:r>
               <a:rPr lang="en-US" sz="1400" b="1" dirty="0" smtClean="0"/>
-              <a:t>: </a:t>
-            </a:r>
-            <a:endParaRPr lang="en-US" sz="1400" b="1" dirty="0"/>
+              <a:t>:</a:t>
+            </a:r>
+          </a:p>
+          <a:p>
+            <a:pPr algn="ctr"/>
+            <a:r>
+              <a:rPr lang="en-US" sz="1400" dirty="0" smtClean="0"/>
+              <a:t>DDOS Attack Test,</a:t>
+            </a:r>
+          </a:p>
+          <a:p>
+            <a:pPr algn="ctr"/>
+            <a:r>
+              <a:rPr lang="en-US" sz="1400" dirty="0" smtClean="0"/>
+              <a:t>Helped with Load Balancing</a:t>
+            </a:r>
+            <a:endParaRPr lang="en-US" sz="1400" dirty="0"/>
           </a:p>
         </p:txBody>
       </p:sp>
@@ -10907,7 +10921,37 @@
           <a:bodyPr/>
           <a:lstStyle/>
           <a:p>
-            <a:endParaRPr lang="en-US"/>
+            <a:r>
+              <a:rPr lang="en-US" dirty="0" smtClean="0"/>
+              <a:t>Can protect against DDOS attack instead of DOS only.</a:t>
+            </a:r>
+          </a:p>
+          <a:p>
+            <a:r>
+              <a:rPr lang="en-US" dirty="0" err="1" smtClean="0"/>
+              <a:t>Heatmap</a:t>
+            </a:r>
+            <a:r>
+              <a:rPr lang="en-US" dirty="0" smtClean="0"/>
+              <a:t> of Incoming Traffic.</a:t>
+            </a:r>
+          </a:p>
+          <a:p>
+            <a:r>
+              <a:rPr lang="en-US" dirty="0" smtClean="0"/>
+              <a:t>Different Load Balancing Algorithms</a:t>
+            </a:r>
+          </a:p>
+          <a:p>
+            <a:r>
+              <a:rPr lang="en-US" dirty="0" smtClean="0"/>
+              <a:t>Shell file to install all </a:t>
+            </a:r>
+            <a:r>
+              <a:rPr lang="en-US" dirty="0" err="1" smtClean="0"/>
+              <a:t>dependancies</a:t>
+            </a:r>
+            <a:endParaRPr lang="en-US" dirty="0"/>
           </a:p>
         </p:txBody>
       </p:sp>
@@ -11095,7 +11139,30 @@
           <a:bodyPr/>
           <a:lstStyle/>
           <a:p>
-            <a:endParaRPr lang="en-US"/>
+            <a:r>
+              <a:rPr lang="en-US" dirty="0" smtClean="0"/>
+              <a:t>Optimizing database connection</a:t>
+            </a:r>
+          </a:p>
+          <a:p>
+            <a:r>
+              <a:rPr lang="en-US" dirty="0" smtClean="0"/>
+              <a:t>Adding triggers to database</a:t>
+            </a:r>
+            <a:endParaRPr lang="en-US" dirty="0" smtClean="0"/>
+          </a:p>
+          <a:p>
+            <a:r>
+              <a:rPr lang="en-US" dirty="0" smtClean="0"/>
+              <a:t>Exponential counter for blacklisting</a:t>
+            </a:r>
+          </a:p>
+          <a:p>
+            <a:r>
+              <a:rPr lang="en-US" dirty="0" smtClean="0"/>
+              <a:t>Improving interface to backend compatibility</a:t>
+            </a:r>
+            <a:endParaRPr lang="en-US" dirty="0"/>
           </a:p>
         </p:txBody>
       </p:sp>
@@ -11184,7 +11251,35 @@
           <a:bodyPr/>
           <a:lstStyle/>
           <a:p>
-            <a:endParaRPr lang="en-US"/>
+            <a:r>
+              <a:rPr lang="en-US" dirty="0" smtClean="0"/>
+              <a:t>Logging provides capabilities for forensic investigation into possible attacks</a:t>
+            </a:r>
+          </a:p>
+          <a:p>
+            <a:r>
+              <a:rPr lang="en-US" dirty="0" smtClean="0"/>
+              <a:t>Can protect any backend server that is registered with the device</a:t>
+            </a:r>
+          </a:p>
+          <a:p>
+            <a:r>
+              <a:rPr lang="en-US" dirty="0" smtClean="0"/>
+              <a:t>Possibility to defend against SYN attacks from number of connections implementation</a:t>
+            </a:r>
+          </a:p>
+          <a:p>
+            <a:r>
+              <a:rPr lang="en-US" dirty="0" smtClean="0"/>
+              <a:t>Documentation is user friendly </a:t>
+            </a:r>
+            <a:endParaRPr lang="en-US" dirty="0" smtClean="0"/>
+          </a:p>
+          <a:p>
+            <a:pPr marL="0" indent="0">
+              <a:buNone/>
+            </a:pPr>
+            <a:endParaRPr lang="en-US" dirty="0"/>
           </a:p>
         </p:txBody>
       </p:sp>
@@ -11512,7 +11607,7 @@
   <a:extraClrSchemeLst/>
   <a:extLst>
     <a:ext uri="{05A4C25C-085E-4340-85A3-A5531E510DB2}">
-      <thm15:themeFamily xmlns:thm15="http://schemas.microsoft.com/office/thememl/2012/main" xmlns="" name="Wisp" id="{7CB32D59-10C0-40DD-B7BD-2E94284A981C}" vid="{24B1A44C-C006-48B2-A4D7-E5549B3D8CD4}"/>
+      <thm15:themeFamily xmlns="" xmlns:thm15="http://schemas.microsoft.com/office/thememl/2012/main" name="Wisp" id="{7CB32D59-10C0-40DD-B7BD-2E94284A981C}" vid="{24B1A44C-C006-48B2-A4D7-E5549B3D8CD4}"/>
     </a:ext>
   </a:extLst>
 </a:theme>

</xml_diff>

<commit_message>
Add backends in user manual
</commit_message>
<xml_diff>
--- a/SRS/SlideShow4.pptx
+++ b/SRS/SlideShow4.pptx
@@ -113,7 +113,7 @@
   </p:defaultTextStyle>
   <p:extLst>
     <p:ext uri="{EFAFB233-063F-42B5-8137-9DF3F51BA10A}">
-      <p15:sldGuideLst xmlns:p15="http://schemas.microsoft.com/office/powerpoint/2012/main">
+      <p15:sldGuideLst xmlns="" xmlns:p15="http://schemas.microsoft.com/office/powerpoint/2012/main">
         <p15:guide id="1" orient="horz" pos="2160">
           <p15:clr>
             <a:srgbClr val="A4A3A4"/>
@@ -318,7 +318,7 @@
           <a:p>
             <a:fld id="{030CC8C2-31CE-435F-A416-A5DD09A07E33}" type="datetimeFigureOut">
               <a:rPr lang="en-ZA" smtClean="0"/>
-              <a:t>2019/08/21</a:t>
+              <a:t>2019/08/22</a:t>
             </a:fld>
             <a:endParaRPr lang="en-ZA"/>
           </a:p>
@@ -656,7 +656,7 @@
           <a:p>
             <a:fld id="{030CC8C2-31CE-435F-A416-A5DD09A07E33}" type="datetimeFigureOut">
               <a:rPr lang="en-ZA" smtClean="0"/>
-              <a:t>2019/08/21</a:t>
+              <a:t>2019/08/22</a:t>
             </a:fld>
             <a:endParaRPr lang="en-ZA"/>
           </a:p>
@@ -1057,7 +1057,7 @@
           <a:p>
             <a:fld id="{030CC8C2-31CE-435F-A416-A5DD09A07E33}" type="datetimeFigureOut">
               <a:rPr lang="en-ZA" smtClean="0"/>
-              <a:t>2019/08/21</a:t>
+              <a:t>2019/08/22</a:t>
             </a:fld>
             <a:endParaRPr lang="en-ZA"/>
           </a:p>
@@ -1393,7 +1393,7 @@
           <a:p>
             <a:fld id="{030CC8C2-31CE-435F-A416-A5DD09A07E33}" type="datetimeFigureOut">
               <a:rPr lang="en-ZA" smtClean="0"/>
-              <a:t>2019/08/21</a:t>
+              <a:t>2019/08/22</a:t>
             </a:fld>
             <a:endParaRPr lang="en-ZA"/>
           </a:p>
@@ -1713,7 +1713,7 @@
           <a:p>
             <a:fld id="{030CC8C2-31CE-435F-A416-A5DD09A07E33}" type="datetimeFigureOut">
               <a:rPr lang="en-ZA" smtClean="0"/>
-              <a:t>2019/08/21</a:t>
+              <a:t>2019/08/22</a:t>
             </a:fld>
             <a:endParaRPr lang="en-ZA"/>
           </a:p>
@@ -2109,7 +2109,7 @@
           <a:p>
             <a:fld id="{030CC8C2-31CE-435F-A416-A5DD09A07E33}" type="datetimeFigureOut">
               <a:rPr lang="en-ZA" smtClean="0"/>
-              <a:t>2019/08/21</a:t>
+              <a:t>2019/08/22</a:t>
             </a:fld>
             <a:endParaRPr lang="en-ZA"/>
           </a:p>
@@ -2366,7 +2366,7 @@
           <a:p>
             <a:fld id="{030CC8C2-31CE-435F-A416-A5DD09A07E33}" type="datetimeFigureOut">
               <a:rPr lang="en-ZA" smtClean="0"/>
-              <a:t>2019/08/21</a:t>
+              <a:t>2019/08/22</a:t>
             </a:fld>
             <a:endParaRPr lang="en-ZA"/>
           </a:p>
@@ -2628,7 +2628,7 @@
           <a:p>
             <a:fld id="{030CC8C2-31CE-435F-A416-A5DD09A07E33}" type="datetimeFigureOut">
               <a:rPr lang="en-ZA" smtClean="0"/>
-              <a:t>2019/08/21</a:t>
+              <a:t>2019/08/22</a:t>
             </a:fld>
             <a:endParaRPr lang="en-ZA"/>
           </a:p>
@@ -2890,7 +2890,7 @@
           <a:p>
             <a:fld id="{030CC8C2-31CE-435F-A416-A5DD09A07E33}" type="datetimeFigureOut">
               <a:rPr lang="en-ZA" smtClean="0"/>
-              <a:t>2019/08/21</a:t>
+              <a:t>2019/08/22</a:t>
             </a:fld>
             <a:endParaRPr lang="en-ZA"/>
           </a:p>
@@ -3219,7 +3219,7 @@
           <a:p>
             <a:fld id="{030CC8C2-31CE-435F-A416-A5DD09A07E33}" type="datetimeFigureOut">
               <a:rPr lang="en-ZA" smtClean="0"/>
-              <a:t>2019/08/21</a:t>
+              <a:t>2019/08/22</a:t>
             </a:fld>
             <a:endParaRPr lang="en-ZA"/>
           </a:p>
@@ -3542,7 +3542,7 @@
           <a:p>
             <a:fld id="{030CC8C2-31CE-435F-A416-A5DD09A07E33}" type="datetimeFigureOut">
               <a:rPr lang="en-ZA" smtClean="0"/>
-              <a:t>2019/08/21</a:t>
+              <a:t>2019/08/22</a:t>
             </a:fld>
             <a:endParaRPr lang="en-ZA"/>
           </a:p>
@@ -3999,7 +3999,7 @@
           <a:p>
             <a:fld id="{030CC8C2-31CE-435F-A416-A5DD09A07E33}" type="datetimeFigureOut">
               <a:rPr lang="en-ZA" smtClean="0"/>
-              <a:t>2019/08/21</a:t>
+              <a:t>2019/08/22</a:t>
             </a:fld>
             <a:endParaRPr lang="en-ZA"/>
           </a:p>
@@ -4204,7 +4204,7 @@
           <a:p>
             <a:fld id="{030CC8C2-31CE-435F-A416-A5DD09A07E33}" type="datetimeFigureOut">
               <a:rPr lang="en-ZA" smtClean="0"/>
-              <a:t>2019/08/21</a:t>
+              <a:t>2019/08/22</a:t>
             </a:fld>
             <a:endParaRPr lang="en-ZA"/>
           </a:p>
@@ -4381,7 +4381,7 @@
           <a:p>
             <a:fld id="{030CC8C2-31CE-435F-A416-A5DD09A07E33}" type="datetimeFigureOut">
               <a:rPr lang="en-ZA" smtClean="0"/>
-              <a:t>2019/08/21</a:t>
+              <a:t>2019/08/22</a:t>
             </a:fld>
             <a:endParaRPr lang="en-ZA"/>
           </a:p>
@@ -4714,7 +4714,7 @@
           <a:p>
             <a:fld id="{030CC8C2-31CE-435F-A416-A5DD09A07E33}" type="datetimeFigureOut">
               <a:rPr lang="en-ZA" smtClean="0"/>
-              <a:t>2019/08/21</a:t>
+              <a:t>2019/08/22</a:t>
             </a:fld>
             <a:endParaRPr lang="en-ZA"/>
           </a:p>
@@ -5059,7 +5059,7 @@
           <a:p>
             <a:fld id="{030CC8C2-31CE-435F-A416-A5DD09A07E33}" type="datetimeFigureOut">
               <a:rPr lang="en-ZA" smtClean="0"/>
-              <a:t>2019/08/21</a:t>
+              <a:t>2019/08/22</a:t>
             </a:fld>
             <a:endParaRPr lang="en-ZA"/>
           </a:p>
@@ -7176,7 +7176,7 @@
           <a:p>
             <a:fld id="{030CC8C2-31CE-435F-A416-A5DD09A07E33}" type="datetimeFigureOut">
               <a:rPr lang="en-ZA" smtClean="0"/>
-              <a:t>2019/08/21</a:t>
+              <a:t>2019/08/22</a:t>
             </a:fld>
             <a:endParaRPr lang="en-ZA"/>
           </a:p>
@@ -7725,10 +7725,10 @@
           <p:cNvPr id="8" name="Rectangle 7">
             <a:extLst>
               <a:ext uri="{FF2B5EF4-FFF2-40B4-BE49-F238E27FC236}">
-                <a16:creationId xmlns:a16="http://schemas.microsoft.com/office/drawing/2014/main" id="{F81819F9-8CAC-4A6C-8F06-0482027F9736}"/>
+                <a16:creationId xmlns="" xmlns:a16="http://schemas.microsoft.com/office/drawing/2014/main" id="{F81819F9-8CAC-4A6C-8F06-0482027F9736}"/>
               </a:ext>
               <a:ext uri="{C183D7F6-B498-43B3-948B-1728B52AA6E4}">
-                <adec:decorative xmlns:adec="http://schemas.microsoft.com/office/drawing/2017/decorative" val="1"/>
+                <adec:decorative xmlns="" xmlns:adec="http://schemas.microsoft.com/office/drawing/2017/decorative" val="1"/>
               </a:ext>
             </a:extLst>
           </p:cNvPr>
@@ -7738,7 +7738,7 @@
           <p:nvPr>
             <p:extLst>
               <p:ext uri="{386F3935-93C4-4BCD-93E2-E3B085C9AB24}">
-                <p16:designElem xmlns:p16="http://schemas.microsoft.com/office/powerpoint/2015/main" val="1"/>
+                <p16:designElem xmlns="" xmlns:p16="http://schemas.microsoft.com/office/powerpoint/2015/main" val="1"/>
               </p:ext>
             </p:extLst>
           </p:nvPr>
@@ -7785,7 +7785,7 @@
           <p:cNvPr id="2" name="Title 1">
             <a:extLst>
               <a:ext uri="{FF2B5EF4-FFF2-40B4-BE49-F238E27FC236}">
-                <a16:creationId xmlns:a16="http://schemas.microsoft.com/office/drawing/2014/main" id="{ACCA312D-3828-4024-9CA0-545EE469B88F}"/>
+                <a16:creationId xmlns="" xmlns:a16="http://schemas.microsoft.com/office/drawing/2014/main" id="{ACCA312D-3828-4024-9CA0-545EE469B88F}"/>
               </a:ext>
             </a:extLst>
           </p:cNvPr>
@@ -7840,6 +7840,13 @@
               </a:rPr>
               <a:t>nites</a:t>
             </a:r>
+            <a:r>
+              <a:rPr lang="en-ZA" sz="5000" dirty="0">
+                <a:latin typeface="Times New Roman" panose="02020603050405020304" pitchFamily="18" charset="0"/>
+                <a:cs typeface="Times New Roman" panose="02020603050405020304" pitchFamily="18" charset="0"/>
+              </a:rPr>
+              <a:t/>
+            </a:r>
             <a:br>
               <a:rPr lang="en-ZA" sz="5000" dirty="0">
                 <a:latin typeface="Times New Roman" panose="02020603050405020304" pitchFamily="18" charset="0"/>
@@ -7865,7 +7872,7 @@
           <p:cNvPr id="3" name="Subtitle 2">
             <a:extLst>
               <a:ext uri="{FF2B5EF4-FFF2-40B4-BE49-F238E27FC236}">
-                <a16:creationId xmlns:a16="http://schemas.microsoft.com/office/drawing/2014/main" id="{C7503EA1-3526-455A-926A-3FC10C2110C2}"/>
+                <a16:creationId xmlns="" xmlns:a16="http://schemas.microsoft.com/office/drawing/2014/main" id="{C7503EA1-3526-455A-926A-3FC10C2110C2}"/>
               </a:ext>
             </a:extLst>
           </p:cNvPr>
@@ -7910,10 +7917,10 @@
           <p:cNvPr id="10" name="Rectangle 9">
             <a:extLst>
               <a:ext uri="{FF2B5EF4-FFF2-40B4-BE49-F238E27FC236}">
-                <a16:creationId xmlns:a16="http://schemas.microsoft.com/office/drawing/2014/main" id="{4A98CC08-AEC2-4E8F-8F52-0F5C6372DB4F}"/>
+                <a16:creationId xmlns="" xmlns:a16="http://schemas.microsoft.com/office/drawing/2014/main" id="{4A98CC08-AEC2-4E8F-8F52-0F5C6372DB4F}"/>
               </a:ext>
               <a:ext uri="{C183D7F6-B498-43B3-948B-1728B52AA6E4}">
-                <adec:decorative xmlns:adec="http://schemas.microsoft.com/office/drawing/2017/decorative" val="1"/>
+                <adec:decorative xmlns="" xmlns:adec="http://schemas.microsoft.com/office/drawing/2017/decorative" val="1"/>
               </a:ext>
             </a:extLst>
           </p:cNvPr>
@@ -7923,7 +7930,7 @@
           <p:nvPr>
             <p:extLst>
               <p:ext uri="{386F3935-93C4-4BCD-93E2-E3B085C9AB24}">
-                <p16:designElem xmlns:p16="http://schemas.microsoft.com/office/powerpoint/2015/main" val="1"/>
+                <p16:designElem xmlns="" xmlns:p16="http://schemas.microsoft.com/office/powerpoint/2015/main" val="1"/>
               </p:ext>
             </p:extLst>
           </p:nvPr>
@@ -7973,10 +7980,10 @@
           <p:cNvPr id="12" name="Group 11">
             <a:extLst>
               <a:ext uri="{FF2B5EF4-FFF2-40B4-BE49-F238E27FC236}">
-                <a16:creationId xmlns:a16="http://schemas.microsoft.com/office/drawing/2014/main" id="{5D1545E6-EB3C-4478-A661-A2CA963F129C}"/>
+                <a16:creationId xmlns="" xmlns:a16="http://schemas.microsoft.com/office/drawing/2014/main" id="{5D1545E6-EB3C-4478-A661-A2CA963F129C}"/>
               </a:ext>
               <a:ext uri="{C183D7F6-B498-43B3-948B-1728B52AA6E4}">
-                <adec:decorative xmlns:adec="http://schemas.microsoft.com/office/drawing/2017/decorative" val="1"/>
+                <adec:decorative xmlns="" xmlns:adec="http://schemas.microsoft.com/office/drawing/2017/decorative" val="1"/>
               </a:ext>
             </a:extLst>
           </p:cNvPr>
@@ -7986,7 +7993,7 @@
           <p:nvPr>
             <p:extLst>
               <p:ext uri="{386F3935-93C4-4BCD-93E2-E3B085C9AB24}">
-                <p16:designElem xmlns:p16="http://schemas.microsoft.com/office/powerpoint/2015/main" val="1"/>
+                <p16:designElem xmlns="" xmlns:p16="http://schemas.microsoft.com/office/powerpoint/2015/main" val="1"/>
               </p:ext>
             </p:extLst>
           </p:nvPr>
@@ -8011,10 +8018,10 @@
             <p:cNvPr id="13" name="Freeform 11">
               <a:extLst>
                 <a:ext uri="{FF2B5EF4-FFF2-40B4-BE49-F238E27FC236}">
-                  <a16:creationId xmlns:a16="http://schemas.microsoft.com/office/drawing/2014/main" id="{B2E5B960-0C5D-4F77-8E9F-9F3D883D83C5}"/>
+                  <a16:creationId xmlns="" xmlns:a16="http://schemas.microsoft.com/office/drawing/2014/main" id="{B2E5B960-0C5D-4F77-8E9F-9F3D883D83C5}"/>
                 </a:ext>
                 <a:ext uri="{C183D7F6-B498-43B3-948B-1728B52AA6E4}">
-                  <adec:decorative xmlns:adec="http://schemas.microsoft.com/office/drawing/2017/decorative" val="1"/>
+                  <adec:decorative xmlns="" xmlns:adec="http://schemas.microsoft.com/office/drawing/2017/decorative" val="1"/>
                 </a:ext>
               </a:extLst>
             </p:cNvPr>
@@ -8022,7 +8029,7 @@
             <p:nvPr>
               <p:extLst>
                 <p:ext uri="{386F3935-93C4-4BCD-93E2-E3B085C9AB24}">
-                  <p16:designElem xmlns:p16="http://schemas.microsoft.com/office/powerpoint/2015/main" val="1"/>
+                  <p16:designElem xmlns="" xmlns:p16="http://schemas.microsoft.com/office/powerpoint/2015/main" val="1"/>
                 </p:ext>
               </p:extLst>
             </p:nvPr>
@@ -8083,10 +8090,10 @@
             <p:cNvPr id="14" name="Freeform 12">
               <a:extLst>
                 <a:ext uri="{FF2B5EF4-FFF2-40B4-BE49-F238E27FC236}">
-                  <a16:creationId xmlns:a16="http://schemas.microsoft.com/office/drawing/2014/main" id="{258E44FC-92AD-43A0-BB05-DB268C82D8B2}"/>
+                  <a16:creationId xmlns="" xmlns:a16="http://schemas.microsoft.com/office/drawing/2014/main" id="{258E44FC-92AD-43A0-BB05-DB268C82D8B2}"/>
                 </a:ext>
                 <a:ext uri="{C183D7F6-B498-43B3-948B-1728B52AA6E4}">
-                  <adec:decorative xmlns:adec="http://schemas.microsoft.com/office/drawing/2017/decorative" val="1"/>
+                  <adec:decorative xmlns="" xmlns:adec="http://schemas.microsoft.com/office/drawing/2017/decorative" val="1"/>
                 </a:ext>
               </a:extLst>
             </p:cNvPr>
@@ -8094,7 +8101,7 @@
             <p:nvPr>
               <p:extLst>
                 <p:ext uri="{386F3935-93C4-4BCD-93E2-E3B085C9AB24}">
-                  <p16:designElem xmlns:p16="http://schemas.microsoft.com/office/powerpoint/2015/main" val="1"/>
+                  <p16:designElem xmlns="" xmlns:p16="http://schemas.microsoft.com/office/powerpoint/2015/main" val="1"/>
                 </p:ext>
               </p:extLst>
             </p:nvPr>
@@ -8160,10 +8167,10 @@
             <p:cNvPr id="15" name="Freeform 13">
               <a:extLst>
                 <a:ext uri="{FF2B5EF4-FFF2-40B4-BE49-F238E27FC236}">
-                  <a16:creationId xmlns:a16="http://schemas.microsoft.com/office/drawing/2014/main" id="{C63D3083-A56C-4199-8DE0-63C8BE9EDFE9}"/>
+                  <a16:creationId xmlns="" xmlns:a16="http://schemas.microsoft.com/office/drawing/2014/main" id="{C63D3083-A56C-4199-8DE0-63C8BE9EDFE9}"/>
                 </a:ext>
                 <a:ext uri="{C183D7F6-B498-43B3-948B-1728B52AA6E4}">
-                  <adec:decorative xmlns:adec="http://schemas.microsoft.com/office/drawing/2017/decorative" val="1"/>
+                  <adec:decorative xmlns="" xmlns:adec="http://schemas.microsoft.com/office/drawing/2017/decorative" val="1"/>
                 </a:ext>
               </a:extLst>
             </p:cNvPr>
@@ -8171,7 +8178,7 @@
             <p:nvPr>
               <p:extLst>
                 <p:ext uri="{386F3935-93C4-4BCD-93E2-E3B085C9AB24}">
-                  <p16:designElem xmlns:p16="http://schemas.microsoft.com/office/powerpoint/2015/main" val="1"/>
+                  <p16:designElem xmlns="" xmlns:p16="http://schemas.microsoft.com/office/powerpoint/2015/main" val="1"/>
                 </p:ext>
               </p:extLst>
             </p:nvPr>
@@ -8242,10 +8249,10 @@
             <p:cNvPr id="16" name="Freeform 14">
               <a:extLst>
                 <a:ext uri="{FF2B5EF4-FFF2-40B4-BE49-F238E27FC236}">
-                  <a16:creationId xmlns:a16="http://schemas.microsoft.com/office/drawing/2014/main" id="{C7CD3581-635D-438F-A64F-68404E7AE0B8}"/>
+                  <a16:creationId xmlns="" xmlns:a16="http://schemas.microsoft.com/office/drawing/2014/main" id="{C7CD3581-635D-438F-A64F-68404E7AE0B8}"/>
                 </a:ext>
                 <a:ext uri="{C183D7F6-B498-43B3-948B-1728B52AA6E4}">
-                  <adec:decorative xmlns:adec="http://schemas.microsoft.com/office/drawing/2017/decorative" val="1"/>
+                  <adec:decorative xmlns="" xmlns:adec="http://schemas.microsoft.com/office/drawing/2017/decorative" val="1"/>
                 </a:ext>
               </a:extLst>
             </p:cNvPr>
@@ -8253,7 +8260,7 @@
             <p:nvPr>
               <p:extLst>
                 <p:ext uri="{386F3935-93C4-4BCD-93E2-E3B085C9AB24}">
-                  <p16:designElem xmlns:p16="http://schemas.microsoft.com/office/powerpoint/2015/main" val="1"/>
+                  <p16:designElem xmlns="" xmlns:p16="http://schemas.microsoft.com/office/powerpoint/2015/main" val="1"/>
                 </p:ext>
               </p:extLst>
             </p:nvPr>
@@ -8304,10 +8311,10 @@
             <p:cNvPr id="17" name="Freeform 15">
               <a:extLst>
                 <a:ext uri="{FF2B5EF4-FFF2-40B4-BE49-F238E27FC236}">
-                  <a16:creationId xmlns:a16="http://schemas.microsoft.com/office/drawing/2014/main" id="{AD6904C0-211C-41A2-BDB8-3B07C90BBB4C}"/>
+                  <a16:creationId xmlns="" xmlns:a16="http://schemas.microsoft.com/office/drawing/2014/main" id="{AD6904C0-211C-41A2-BDB8-3B07C90BBB4C}"/>
                 </a:ext>
                 <a:ext uri="{C183D7F6-B498-43B3-948B-1728B52AA6E4}">
-                  <adec:decorative xmlns:adec="http://schemas.microsoft.com/office/drawing/2017/decorative" val="1"/>
+                  <adec:decorative xmlns="" xmlns:adec="http://schemas.microsoft.com/office/drawing/2017/decorative" val="1"/>
                 </a:ext>
               </a:extLst>
             </p:cNvPr>
@@ -8315,7 +8322,7 @@
             <p:nvPr>
               <p:extLst>
                 <p:ext uri="{386F3935-93C4-4BCD-93E2-E3B085C9AB24}">
-                  <p16:designElem xmlns:p16="http://schemas.microsoft.com/office/powerpoint/2015/main" val="1"/>
+                  <p16:designElem xmlns="" xmlns:p16="http://schemas.microsoft.com/office/powerpoint/2015/main" val="1"/>
                 </p:ext>
               </p:extLst>
             </p:nvPr>
@@ -8401,10 +8408,10 @@
             <p:cNvPr id="18" name="Freeform 16">
               <a:extLst>
                 <a:ext uri="{FF2B5EF4-FFF2-40B4-BE49-F238E27FC236}">
-                  <a16:creationId xmlns:a16="http://schemas.microsoft.com/office/drawing/2014/main" id="{B0837DA6-CAF9-4E78-A39E-6358EDE2B108}"/>
+                  <a16:creationId xmlns="" xmlns:a16="http://schemas.microsoft.com/office/drawing/2014/main" id="{B0837DA6-CAF9-4E78-A39E-6358EDE2B108}"/>
                 </a:ext>
                 <a:ext uri="{C183D7F6-B498-43B3-948B-1728B52AA6E4}">
-                  <adec:decorative xmlns:adec="http://schemas.microsoft.com/office/drawing/2017/decorative" val="1"/>
+                  <adec:decorative xmlns="" xmlns:adec="http://schemas.microsoft.com/office/drawing/2017/decorative" val="1"/>
                 </a:ext>
               </a:extLst>
             </p:cNvPr>
@@ -8412,7 +8419,7 @@
             <p:nvPr>
               <p:extLst>
                 <p:ext uri="{386F3935-93C4-4BCD-93E2-E3B085C9AB24}">
-                  <p16:designElem xmlns:p16="http://schemas.microsoft.com/office/powerpoint/2015/main" val="1"/>
+                  <p16:designElem xmlns="" xmlns:p16="http://schemas.microsoft.com/office/powerpoint/2015/main" val="1"/>
                 </p:ext>
               </p:extLst>
             </p:nvPr>
@@ -8493,10 +8500,10 @@
             <p:cNvPr id="19" name="Freeform 17">
               <a:extLst>
                 <a:ext uri="{FF2B5EF4-FFF2-40B4-BE49-F238E27FC236}">
-                  <a16:creationId xmlns:a16="http://schemas.microsoft.com/office/drawing/2014/main" id="{0A99DD7D-3AB3-471E-842F-8AFEA09D07E4}"/>
+                  <a16:creationId xmlns="" xmlns:a16="http://schemas.microsoft.com/office/drawing/2014/main" id="{0A99DD7D-3AB3-471E-842F-8AFEA09D07E4}"/>
                 </a:ext>
                 <a:ext uri="{C183D7F6-B498-43B3-948B-1728B52AA6E4}">
-                  <adec:decorative xmlns:adec="http://schemas.microsoft.com/office/drawing/2017/decorative" val="1"/>
+                  <adec:decorative xmlns="" xmlns:adec="http://schemas.microsoft.com/office/drawing/2017/decorative" val="1"/>
                 </a:ext>
               </a:extLst>
             </p:cNvPr>
@@ -8504,7 +8511,7 @@
             <p:nvPr>
               <p:extLst>
                 <p:ext uri="{386F3935-93C4-4BCD-93E2-E3B085C9AB24}">
-                  <p16:designElem xmlns:p16="http://schemas.microsoft.com/office/powerpoint/2015/main" val="1"/>
+                  <p16:designElem xmlns="" xmlns:p16="http://schemas.microsoft.com/office/powerpoint/2015/main" val="1"/>
                 </p:ext>
               </p:extLst>
             </p:nvPr>
@@ -8565,10 +8572,10 @@
             <p:cNvPr id="20" name="Freeform 18">
               <a:extLst>
                 <a:ext uri="{FF2B5EF4-FFF2-40B4-BE49-F238E27FC236}">
-                  <a16:creationId xmlns:a16="http://schemas.microsoft.com/office/drawing/2014/main" id="{9C70B0D4-92FE-478F-86BD-93BA2C4DFCDC}"/>
+                  <a16:creationId xmlns="" xmlns:a16="http://schemas.microsoft.com/office/drawing/2014/main" id="{9C70B0D4-92FE-478F-86BD-93BA2C4DFCDC}"/>
                 </a:ext>
                 <a:ext uri="{C183D7F6-B498-43B3-948B-1728B52AA6E4}">
-                  <adec:decorative xmlns:adec="http://schemas.microsoft.com/office/drawing/2017/decorative" val="1"/>
+                  <adec:decorative xmlns="" xmlns:adec="http://schemas.microsoft.com/office/drawing/2017/decorative" val="1"/>
                 </a:ext>
               </a:extLst>
             </p:cNvPr>
@@ -8576,7 +8583,7 @@
             <p:nvPr>
               <p:extLst>
                 <p:ext uri="{386F3935-93C4-4BCD-93E2-E3B085C9AB24}">
-                  <p16:designElem xmlns:p16="http://schemas.microsoft.com/office/powerpoint/2015/main" val="1"/>
+                  <p16:designElem xmlns="" xmlns:p16="http://schemas.microsoft.com/office/powerpoint/2015/main" val="1"/>
                 </p:ext>
               </p:extLst>
             </p:nvPr>
@@ -8657,10 +8664,10 @@
             <p:cNvPr id="21" name="Freeform 19">
               <a:extLst>
                 <a:ext uri="{FF2B5EF4-FFF2-40B4-BE49-F238E27FC236}">
-                  <a16:creationId xmlns:a16="http://schemas.microsoft.com/office/drawing/2014/main" id="{C9156BE6-11D4-4696-9E3F-C325BFAC8196}"/>
+                  <a16:creationId xmlns="" xmlns:a16="http://schemas.microsoft.com/office/drawing/2014/main" id="{C9156BE6-11D4-4696-9E3F-C325BFAC8196}"/>
                 </a:ext>
                 <a:ext uri="{C183D7F6-B498-43B3-948B-1728B52AA6E4}">
-                  <adec:decorative xmlns:adec="http://schemas.microsoft.com/office/drawing/2017/decorative" val="1"/>
+                  <adec:decorative xmlns="" xmlns:adec="http://schemas.microsoft.com/office/drawing/2017/decorative" val="1"/>
                 </a:ext>
               </a:extLst>
             </p:cNvPr>
@@ -8668,7 +8675,7 @@
             <p:nvPr>
               <p:extLst>
                 <p:ext uri="{386F3935-93C4-4BCD-93E2-E3B085C9AB24}">
-                  <p16:designElem xmlns:p16="http://schemas.microsoft.com/office/powerpoint/2015/main" val="1"/>
+                  <p16:designElem xmlns="" xmlns:p16="http://schemas.microsoft.com/office/powerpoint/2015/main" val="1"/>
                 </p:ext>
               </p:extLst>
             </p:nvPr>
@@ -8784,10 +8791,10 @@
             <p:cNvPr id="22" name="Freeform 20">
               <a:extLst>
                 <a:ext uri="{FF2B5EF4-FFF2-40B4-BE49-F238E27FC236}">
-                  <a16:creationId xmlns:a16="http://schemas.microsoft.com/office/drawing/2014/main" id="{4E667226-1D20-4A9D-BBE3-AC17EA436F05}"/>
+                  <a16:creationId xmlns="" xmlns:a16="http://schemas.microsoft.com/office/drawing/2014/main" id="{4E667226-1D20-4A9D-BBE3-AC17EA436F05}"/>
                 </a:ext>
                 <a:ext uri="{C183D7F6-B498-43B3-948B-1728B52AA6E4}">
-                  <adec:decorative xmlns:adec="http://schemas.microsoft.com/office/drawing/2017/decorative" val="1"/>
+                  <adec:decorative xmlns="" xmlns:adec="http://schemas.microsoft.com/office/drawing/2017/decorative" val="1"/>
                 </a:ext>
               </a:extLst>
             </p:cNvPr>
@@ -8795,7 +8802,7 @@
             <p:nvPr>
               <p:extLst>
                 <p:ext uri="{386F3935-93C4-4BCD-93E2-E3B085C9AB24}">
-                  <p16:designElem xmlns:p16="http://schemas.microsoft.com/office/powerpoint/2015/main" val="1"/>
+                  <p16:designElem xmlns="" xmlns:p16="http://schemas.microsoft.com/office/powerpoint/2015/main" val="1"/>
                 </p:ext>
               </p:extLst>
             </p:nvPr>
@@ -8846,10 +8853,10 @@
             <p:cNvPr id="23" name="Freeform 21">
               <a:extLst>
                 <a:ext uri="{FF2B5EF4-FFF2-40B4-BE49-F238E27FC236}">
-                  <a16:creationId xmlns:a16="http://schemas.microsoft.com/office/drawing/2014/main" id="{2F87E3B6-5202-4434-9B26-42B46774F327}"/>
+                  <a16:creationId xmlns="" xmlns:a16="http://schemas.microsoft.com/office/drawing/2014/main" id="{2F87E3B6-5202-4434-9B26-42B46774F327}"/>
                 </a:ext>
                 <a:ext uri="{C183D7F6-B498-43B3-948B-1728B52AA6E4}">
-                  <adec:decorative xmlns:adec="http://schemas.microsoft.com/office/drawing/2017/decorative" val="1"/>
+                  <adec:decorative xmlns="" xmlns:adec="http://schemas.microsoft.com/office/drawing/2017/decorative" val="1"/>
                 </a:ext>
               </a:extLst>
             </p:cNvPr>
@@ -8857,7 +8864,7 @@
             <p:nvPr>
               <p:extLst>
                 <p:ext uri="{386F3935-93C4-4BCD-93E2-E3B085C9AB24}">
-                  <p16:designElem xmlns:p16="http://schemas.microsoft.com/office/powerpoint/2015/main" val="1"/>
+                  <p16:designElem xmlns="" xmlns:p16="http://schemas.microsoft.com/office/powerpoint/2015/main" val="1"/>
                 </p:ext>
               </p:extLst>
             </p:nvPr>
@@ -8918,10 +8925,10 @@
             <p:cNvPr id="24" name="Freeform 22">
               <a:extLst>
                 <a:ext uri="{FF2B5EF4-FFF2-40B4-BE49-F238E27FC236}">
-                  <a16:creationId xmlns:a16="http://schemas.microsoft.com/office/drawing/2014/main" id="{AEA5E85F-F1F4-40E4-A62C-95324F674929}"/>
+                  <a16:creationId xmlns="" xmlns:a16="http://schemas.microsoft.com/office/drawing/2014/main" id="{AEA5E85F-F1F4-40E4-A62C-95324F674929}"/>
                 </a:ext>
                 <a:ext uri="{C183D7F6-B498-43B3-948B-1728B52AA6E4}">
-                  <adec:decorative xmlns:adec="http://schemas.microsoft.com/office/drawing/2017/decorative" val="1"/>
+                  <adec:decorative xmlns="" xmlns:adec="http://schemas.microsoft.com/office/drawing/2017/decorative" val="1"/>
                 </a:ext>
               </a:extLst>
             </p:cNvPr>
@@ -8929,7 +8936,7 @@
             <p:nvPr>
               <p:extLst>
                 <p:ext uri="{386F3935-93C4-4BCD-93E2-E3B085C9AB24}">
-                  <p16:designElem xmlns:p16="http://schemas.microsoft.com/office/powerpoint/2015/main" val="1"/>
+                  <p16:designElem xmlns="" xmlns:p16="http://schemas.microsoft.com/office/powerpoint/2015/main" val="1"/>
                 </p:ext>
               </p:extLst>
             </p:nvPr>
@@ -9001,10 +9008,10 @@
           <p:cNvPr id="26" name="Group 25">
             <a:extLst>
               <a:ext uri="{FF2B5EF4-FFF2-40B4-BE49-F238E27FC236}">
-                <a16:creationId xmlns:a16="http://schemas.microsoft.com/office/drawing/2014/main" id="{40A75861-F6C5-44A9-B161-B03701CBDE0C}"/>
+                <a16:creationId xmlns="" xmlns:a16="http://schemas.microsoft.com/office/drawing/2014/main" id="{40A75861-F6C5-44A9-B161-B03701CBDE0C}"/>
               </a:ext>
               <a:ext uri="{C183D7F6-B498-43B3-948B-1728B52AA6E4}">
-                <adec:decorative xmlns:adec="http://schemas.microsoft.com/office/drawing/2017/decorative" val="1"/>
+                <adec:decorative xmlns="" xmlns:adec="http://schemas.microsoft.com/office/drawing/2017/decorative" val="1"/>
               </a:ext>
             </a:extLst>
           </p:cNvPr>
@@ -9014,7 +9021,7 @@
           <p:nvPr>
             <p:extLst>
               <p:ext uri="{386F3935-93C4-4BCD-93E2-E3B085C9AB24}">
-                <p16:designElem xmlns:p16="http://schemas.microsoft.com/office/powerpoint/2015/main" val="1"/>
+                <p16:designElem xmlns="" xmlns:p16="http://schemas.microsoft.com/office/powerpoint/2015/main" val="1"/>
               </p:ext>
             </p:extLst>
           </p:nvPr>
@@ -9038,10 +9045,10 @@
             <p:cNvPr id="27" name="Freeform 27">
               <a:extLst>
                 <a:ext uri="{FF2B5EF4-FFF2-40B4-BE49-F238E27FC236}">
-                  <a16:creationId xmlns:a16="http://schemas.microsoft.com/office/drawing/2014/main" id="{72EE642D-4F69-47C0-99BA-CE435035735F}"/>
+                  <a16:creationId xmlns="" xmlns:a16="http://schemas.microsoft.com/office/drawing/2014/main" id="{72EE642D-4F69-47C0-99BA-CE435035735F}"/>
                 </a:ext>
                 <a:ext uri="{C183D7F6-B498-43B3-948B-1728B52AA6E4}">
-                  <adec:decorative xmlns:adec="http://schemas.microsoft.com/office/drawing/2017/decorative" val="1"/>
+                  <adec:decorative xmlns="" xmlns:adec="http://schemas.microsoft.com/office/drawing/2017/decorative" val="1"/>
                 </a:ext>
               </a:extLst>
             </p:cNvPr>
@@ -9049,7 +9056,7 @@
             <p:nvPr>
               <p:extLst>
                 <p:ext uri="{386F3935-93C4-4BCD-93E2-E3B085C9AB24}">
-                  <p16:designElem xmlns:p16="http://schemas.microsoft.com/office/powerpoint/2015/main" val="1"/>
+                  <p16:designElem xmlns="" xmlns:p16="http://schemas.microsoft.com/office/powerpoint/2015/main" val="1"/>
                 </p:ext>
               </p:extLst>
             </p:nvPr>
@@ -9155,10 +9162,10 @@
             <p:cNvPr id="28" name="Freeform 28">
               <a:extLst>
                 <a:ext uri="{FF2B5EF4-FFF2-40B4-BE49-F238E27FC236}">
-                  <a16:creationId xmlns:a16="http://schemas.microsoft.com/office/drawing/2014/main" id="{26178CE4-DA2D-46EA-AB8D-341C5AC563D6}"/>
+                  <a16:creationId xmlns="" xmlns:a16="http://schemas.microsoft.com/office/drawing/2014/main" id="{26178CE4-DA2D-46EA-AB8D-341C5AC563D6}"/>
                 </a:ext>
                 <a:ext uri="{C183D7F6-B498-43B3-948B-1728B52AA6E4}">
-                  <adec:decorative xmlns:adec="http://schemas.microsoft.com/office/drawing/2017/decorative" val="1"/>
+                  <adec:decorative xmlns="" xmlns:adec="http://schemas.microsoft.com/office/drawing/2017/decorative" val="1"/>
                 </a:ext>
               </a:extLst>
             </p:cNvPr>
@@ -9166,7 +9173,7 @@
             <p:nvPr>
               <p:extLst>
                 <p:ext uri="{386F3935-93C4-4BCD-93E2-E3B085C9AB24}">
-                  <p16:designElem xmlns:p16="http://schemas.microsoft.com/office/powerpoint/2015/main" val="1"/>
+                  <p16:designElem xmlns="" xmlns:p16="http://schemas.microsoft.com/office/powerpoint/2015/main" val="1"/>
                 </p:ext>
               </p:extLst>
             </p:nvPr>
@@ -9237,10 +9244,10 @@
             <p:cNvPr id="29" name="Freeform 29">
               <a:extLst>
                 <a:ext uri="{FF2B5EF4-FFF2-40B4-BE49-F238E27FC236}">
-                  <a16:creationId xmlns:a16="http://schemas.microsoft.com/office/drawing/2014/main" id="{698E9F53-8381-4FA5-A510-846925D242CF}"/>
+                  <a16:creationId xmlns="" xmlns:a16="http://schemas.microsoft.com/office/drawing/2014/main" id="{698E9F53-8381-4FA5-A510-846925D242CF}"/>
                 </a:ext>
                 <a:ext uri="{C183D7F6-B498-43B3-948B-1728B52AA6E4}">
-                  <adec:decorative xmlns:adec="http://schemas.microsoft.com/office/drawing/2017/decorative" val="1"/>
+                  <adec:decorative xmlns="" xmlns:adec="http://schemas.microsoft.com/office/drawing/2017/decorative" val="1"/>
                 </a:ext>
               </a:extLst>
             </p:cNvPr>
@@ -9248,7 +9255,7 @@
             <p:nvPr>
               <p:extLst>
                 <p:ext uri="{386F3935-93C4-4BCD-93E2-E3B085C9AB24}">
-                  <p16:designElem xmlns:p16="http://schemas.microsoft.com/office/powerpoint/2015/main" val="1"/>
+                  <p16:designElem xmlns="" xmlns:p16="http://schemas.microsoft.com/office/powerpoint/2015/main" val="1"/>
                 </p:ext>
               </p:extLst>
             </p:nvPr>
@@ -9319,10 +9326,10 @@
             <p:cNvPr id="30" name="Freeform 30">
               <a:extLst>
                 <a:ext uri="{FF2B5EF4-FFF2-40B4-BE49-F238E27FC236}">
-                  <a16:creationId xmlns:a16="http://schemas.microsoft.com/office/drawing/2014/main" id="{B13CE284-F21E-411B-BB8E-9C03B853CE44}"/>
+                  <a16:creationId xmlns="" xmlns:a16="http://schemas.microsoft.com/office/drawing/2014/main" id="{B13CE284-F21E-411B-BB8E-9C03B853CE44}"/>
                 </a:ext>
                 <a:ext uri="{C183D7F6-B498-43B3-948B-1728B52AA6E4}">
-                  <adec:decorative xmlns:adec="http://schemas.microsoft.com/office/drawing/2017/decorative" val="1"/>
+                  <adec:decorative xmlns="" xmlns:adec="http://schemas.microsoft.com/office/drawing/2017/decorative" val="1"/>
                 </a:ext>
               </a:extLst>
             </p:cNvPr>
@@ -9330,7 +9337,7 @@
             <p:nvPr>
               <p:extLst>
                 <p:ext uri="{386F3935-93C4-4BCD-93E2-E3B085C9AB24}">
-                  <p16:designElem xmlns:p16="http://schemas.microsoft.com/office/powerpoint/2015/main" val="1"/>
+                  <p16:designElem xmlns="" xmlns:p16="http://schemas.microsoft.com/office/powerpoint/2015/main" val="1"/>
                 </p:ext>
               </p:extLst>
             </p:nvPr>
@@ -9416,10 +9423,10 @@
             <p:cNvPr id="31" name="Freeform 31">
               <a:extLst>
                 <a:ext uri="{FF2B5EF4-FFF2-40B4-BE49-F238E27FC236}">
-                  <a16:creationId xmlns:a16="http://schemas.microsoft.com/office/drawing/2014/main" id="{23DF4578-4703-437C-A797-2A2D0CEE5F45}"/>
+                  <a16:creationId xmlns="" xmlns:a16="http://schemas.microsoft.com/office/drawing/2014/main" id="{23DF4578-4703-437C-A797-2A2D0CEE5F45}"/>
                 </a:ext>
                 <a:ext uri="{C183D7F6-B498-43B3-948B-1728B52AA6E4}">
-                  <adec:decorative xmlns:adec="http://schemas.microsoft.com/office/drawing/2017/decorative" val="1"/>
+                  <adec:decorative xmlns="" xmlns:adec="http://schemas.microsoft.com/office/drawing/2017/decorative" val="1"/>
                 </a:ext>
               </a:extLst>
             </p:cNvPr>
@@ -9427,7 +9434,7 @@
             <p:nvPr>
               <p:extLst>
                 <p:ext uri="{386F3935-93C4-4BCD-93E2-E3B085C9AB24}">
-                  <p16:designElem xmlns:p16="http://schemas.microsoft.com/office/powerpoint/2015/main" val="1"/>
+                  <p16:designElem xmlns="" xmlns:p16="http://schemas.microsoft.com/office/powerpoint/2015/main" val="1"/>
                 </p:ext>
               </p:extLst>
             </p:nvPr>
@@ -9523,10 +9530,10 @@
             <p:cNvPr id="32" name="Freeform 32">
               <a:extLst>
                 <a:ext uri="{FF2B5EF4-FFF2-40B4-BE49-F238E27FC236}">
-                  <a16:creationId xmlns:a16="http://schemas.microsoft.com/office/drawing/2014/main" id="{F878F330-AF64-4F8F-88FD-A4A408D6D368}"/>
+                  <a16:creationId xmlns="" xmlns:a16="http://schemas.microsoft.com/office/drawing/2014/main" id="{F878F330-AF64-4F8F-88FD-A4A408D6D368}"/>
                 </a:ext>
                 <a:ext uri="{C183D7F6-B498-43B3-948B-1728B52AA6E4}">
-                  <adec:decorative xmlns:adec="http://schemas.microsoft.com/office/drawing/2017/decorative" val="1"/>
+                  <adec:decorative xmlns="" xmlns:adec="http://schemas.microsoft.com/office/drawing/2017/decorative" val="1"/>
                 </a:ext>
               </a:extLst>
             </p:cNvPr>
@@ -9534,7 +9541,7 @@
             <p:nvPr>
               <p:extLst>
                 <p:ext uri="{386F3935-93C4-4BCD-93E2-E3B085C9AB24}">
-                  <p16:designElem xmlns:p16="http://schemas.microsoft.com/office/powerpoint/2015/main" val="1"/>
+                  <p16:designElem xmlns="" xmlns:p16="http://schemas.microsoft.com/office/powerpoint/2015/main" val="1"/>
                 </p:ext>
               </p:extLst>
             </p:nvPr>
@@ -9585,10 +9592,10 @@
             <p:cNvPr id="33" name="Freeform 33">
               <a:extLst>
                 <a:ext uri="{FF2B5EF4-FFF2-40B4-BE49-F238E27FC236}">
-                  <a16:creationId xmlns:a16="http://schemas.microsoft.com/office/drawing/2014/main" id="{AC9B00BF-4FB7-42FA-BBBD-7DB54ED3F061}"/>
+                  <a16:creationId xmlns="" xmlns:a16="http://schemas.microsoft.com/office/drawing/2014/main" id="{AC9B00BF-4FB7-42FA-BBBD-7DB54ED3F061}"/>
                 </a:ext>
                 <a:ext uri="{C183D7F6-B498-43B3-948B-1728B52AA6E4}">
-                  <adec:decorative xmlns:adec="http://schemas.microsoft.com/office/drawing/2017/decorative" val="1"/>
+                  <adec:decorative xmlns="" xmlns:adec="http://schemas.microsoft.com/office/drawing/2017/decorative" val="1"/>
                 </a:ext>
               </a:extLst>
             </p:cNvPr>
@@ -9596,7 +9603,7 @@
             <p:nvPr>
               <p:extLst>
                 <p:ext uri="{386F3935-93C4-4BCD-93E2-E3B085C9AB24}">
-                  <p16:designElem xmlns:p16="http://schemas.microsoft.com/office/powerpoint/2015/main" val="1"/>
+                  <p16:designElem xmlns="" xmlns:p16="http://schemas.microsoft.com/office/powerpoint/2015/main" val="1"/>
                 </p:ext>
               </p:extLst>
             </p:nvPr>
@@ -9662,10 +9669,10 @@
             <p:cNvPr id="34" name="Freeform 34">
               <a:extLst>
                 <a:ext uri="{FF2B5EF4-FFF2-40B4-BE49-F238E27FC236}">
-                  <a16:creationId xmlns:a16="http://schemas.microsoft.com/office/drawing/2014/main" id="{BD3D64CA-2AAD-4609-8DAA-3EAD4609A6B1}"/>
+                  <a16:creationId xmlns="" xmlns:a16="http://schemas.microsoft.com/office/drawing/2014/main" id="{BD3D64CA-2AAD-4609-8DAA-3EAD4609A6B1}"/>
                 </a:ext>
                 <a:ext uri="{C183D7F6-B498-43B3-948B-1728B52AA6E4}">
-                  <adec:decorative xmlns:adec="http://schemas.microsoft.com/office/drawing/2017/decorative" val="1"/>
+                  <adec:decorative xmlns="" xmlns:adec="http://schemas.microsoft.com/office/drawing/2017/decorative" val="1"/>
                 </a:ext>
               </a:extLst>
             </p:cNvPr>
@@ -9673,7 +9680,7 @@
             <p:nvPr>
               <p:extLst>
                 <p:ext uri="{386F3935-93C4-4BCD-93E2-E3B085C9AB24}">
-                  <p16:designElem xmlns:p16="http://schemas.microsoft.com/office/powerpoint/2015/main" val="1"/>
+                  <p16:designElem xmlns="" xmlns:p16="http://schemas.microsoft.com/office/powerpoint/2015/main" val="1"/>
                 </p:ext>
               </p:extLst>
             </p:nvPr>
@@ -9784,10 +9791,10 @@
             <p:cNvPr id="35" name="Freeform 35">
               <a:extLst>
                 <a:ext uri="{FF2B5EF4-FFF2-40B4-BE49-F238E27FC236}">
-                  <a16:creationId xmlns:a16="http://schemas.microsoft.com/office/drawing/2014/main" id="{C669E05A-8550-4E91-B29E-E1912228EC93}"/>
+                  <a16:creationId xmlns="" xmlns:a16="http://schemas.microsoft.com/office/drawing/2014/main" id="{C669E05A-8550-4E91-B29E-E1912228EC93}"/>
                 </a:ext>
                 <a:ext uri="{C183D7F6-B498-43B3-948B-1728B52AA6E4}">
-                  <adec:decorative xmlns:adec="http://schemas.microsoft.com/office/drawing/2017/decorative" val="1"/>
+                  <adec:decorative xmlns="" xmlns:adec="http://schemas.microsoft.com/office/drawing/2017/decorative" val="1"/>
                 </a:ext>
               </a:extLst>
             </p:cNvPr>
@@ -9795,7 +9802,7 @@
             <p:nvPr>
               <p:extLst>
                 <p:ext uri="{386F3935-93C4-4BCD-93E2-E3B085C9AB24}">
-                  <p16:designElem xmlns:p16="http://schemas.microsoft.com/office/powerpoint/2015/main" val="1"/>
+                  <p16:designElem xmlns="" xmlns:p16="http://schemas.microsoft.com/office/powerpoint/2015/main" val="1"/>
                 </p:ext>
               </p:extLst>
             </p:nvPr>
@@ -9846,10 +9853,10 @@
             <p:cNvPr id="36" name="Freeform 36">
               <a:extLst>
                 <a:ext uri="{FF2B5EF4-FFF2-40B4-BE49-F238E27FC236}">
-                  <a16:creationId xmlns:a16="http://schemas.microsoft.com/office/drawing/2014/main" id="{F8C1FD53-1E8F-46CA-BC2D-FCEC4DAE07F6}"/>
+                  <a16:creationId xmlns="" xmlns:a16="http://schemas.microsoft.com/office/drawing/2014/main" id="{F8C1FD53-1E8F-46CA-BC2D-FCEC4DAE07F6}"/>
                 </a:ext>
                 <a:ext uri="{C183D7F6-B498-43B3-948B-1728B52AA6E4}">
-                  <adec:decorative xmlns:adec="http://schemas.microsoft.com/office/drawing/2017/decorative" val="1"/>
+                  <adec:decorative xmlns="" xmlns:adec="http://schemas.microsoft.com/office/drawing/2017/decorative" val="1"/>
                 </a:ext>
               </a:extLst>
             </p:cNvPr>
@@ -9857,7 +9864,7 @@
             <p:nvPr>
               <p:extLst>
                 <p:ext uri="{386F3935-93C4-4BCD-93E2-E3B085C9AB24}">
-                  <p16:designElem xmlns:p16="http://schemas.microsoft.com/office/powerpoint/2015/main" val="1"/>
+                  <p16:designElem xmlns="" xmlns:p16="http://schemas.microsoft.com/office/powerpoint/2015/main" val="1"/>
                 </p:ext>
               </p:extLst>
             </p:nvPr>
@@ -9928,10 +9935,10 @@
             <p:cNvPr id="37" name="Freeform 37">
               <a:extLst>
                 <a:ext uri="{FF2B5EF4-FFF2-40B4-BE49-F238E27FC236}">
-                  <a16:creationId xmlns:a16="http://schemas.microsoft.com/office/drawing/2014/main" id="{CC97A31F-CFDE-4EA3-98F1-13FDD16702E1}"/>
+                  <a16:creationId xmlns="" xmlns:a16="http://schemas.microsoft.com/office/drawing/2014/main" id="{CC97A31F-CFDE-4EA3-98F1-13FDD16702E1}"/>
                 </a:ext>
                 <a:ext uri="{C183D7F6-B498-43B3-948B-1728B52AA6E4}">
-                  <adec:decorative xmlns:adec="http://schemas.microsoft.com/office/drawing/2017/decorative" val="1"/>
+                  <adec:decorative xmlns="" xmlns:adec="http://schemas.microsoft.com/office/drawing/2017/decorative" val="1"/>
                 </a:ext>
               </a:extLst>
             </p:cNvPr>
@@ -9939,7 +9946,7 @@
             <p:nvPr>
               <p:extLst>
                 <p:ext uri="{386F3935-93C4-4BCD-93E2-E3B085C9AB24}">
-                  <p16:designElem xmlns:p16="http://schemas.microsoft.com/office/powerpoint/2015/main" val="1"/>
+                  <p16:designElem xmlns="" xmlns:p16="http://schemas.microsoft.com/office/powerpoint/2015/main" val="1"/>
                 </p:ext>
               </p:extLst>
             </p:nvPr>
@@ -10005,10 +10012,10 @@
             <p:cNvPr id="38" name="Freeform 38">
               <a:extLst>
                 <a:ext uri="{FF2B5EF4-FFF2-40B4-BE49-F238E27FC236}">
-                  <a16:creationId xmlns:a16="http://schemas.microsoft.com/office/drawing/2014/main" id="{9E1540E7-E6C3-4907-B70A-B17568365597}"/>
+                  <a16:creationId xmlns="" xmlns:a16="http://schemas.microsoft.com/office/drawing/2014/main" id="{9E1540E7-E6C3-4907-B70A-B17568365597}"/>
                 </a:ext>
                 <a:ext uri="{C183D7F6-B498-43B3-948B-1728B52AA6E4}">
-                  <adec:decorative xmlns:adec="http://schemas.microsoft.com/office/drawing/2017/decorative" val="1"/>
+                  <adec:decorative xmlns="" xmlns:adec="http://schemas.microsoft.com/office/drawing/2017/decorative" val="1"/>
                 </a:ext>
               </a:extLst>
             </p:cNvPr>
@@ -10016,7 +10023,7 @@
             <p:nvPr>
               <p:extLst>
                 <p:ext uri="{386F3935-93C4-4BCD-93E2-E3B085C9AB24}">
-                  <p16:designElem xmlns:p16="http://schemas.microsoft.com/office/powerpoint/2015/main" val="1"/>
+                  <p16:designElem xmlns="" xmlns:p16="http://schemas.microsoft.com/office/powerpoint/2015/main" val="1"/>
                 </p:ext>
               </p:extLst>
             </p:nvPr>
@@ -10088,10 +10095,10 @@
           <p:cNvPr id="40" name="Freeform 11">
             <a:extLst>
               <a:ext uri="{FF2B5EF4-FFF2-40B4-BE49-F238E27FC236}">
-                <a16:creationId xmlns:a16="http://schemas.microsoft.com/office/drawing/2014/main" id="{1310EFE2-B91D-47E7-B117-C2A802800A7C}"/>
+                <a16:creationId xmlns="" xmlns:a16="http://schemas.microsoft.com/office/drawing/2014/main" id="{1310EFE2-B91D-47E7-B117-C2A802800A7C}"/>
               </a:ext>
               <a:ext uri="{C183D7F6-B498-43B3-948B-1728B52AA6E4}">
-                <adec:decorative xmlns:adec="http://schemas.microsoft.com/office/drawing/2017/decorative" val="1"/>
+                <adec:decorative xmlns="" xmlns:adec="http://schemas.microsoft.com/office/drawing/2017/decorative" val="1"/>
               </a:ext>
             </a:extLst>
           </p:cNvPr>
@@ -10101,7 +10108,7 @@
           <p:nvPr>
             <p:extLst>
               <p:ext uri="{386F3935-93C4-4BCD-93E2-E3B085C9AB24}">
-                <p16:designElem xmlns:p16="http://schemas.microsoft.com/office/powerpoint/2015/main" val="1"/>
+                <p16:designElem xmlns="" xmlns:p16="http://schemas.microsoft.com/office/powerpoint/2015/main" val="1"/>
               </p:ext>
             </p:extLst>
           </p:nvPr>
@@ -10315,6 +10322,13 @@
   <p:clrMapOvr>
     <a:masterClrMapping/>
   </p:clrMapOvr>
+  <p:timing>
+    <p:tnLst>
+      <p:par>
+        <p:cTn id="1" dur="indefinite" restart="never" nodeType="tmRoot"/>
+      </p:par>
+    </p:tnLst>
+  </p:timing>
 </p:sld>
 </file>
 
@@ -10635,6 +10649,19 @@
               <a:rPr lang="en-US" sz="1400" b="1" dirty="0"/>
               <a:t>: </a:t>
             </a:r>
+            <a:endParaRPr lang="en-US" sz="1400" b="1" dirty="0"/>
+          </a:p>
+          <a:p>
+            <a:pPr algn="ctr"/>
+            <a:r>
+              <a:rPr lang="en-US" sz="1400" dirty="0" smtClean="0"/>
+              <a:t>Metrics,  Database Integration </a:t>
+            </a:r>
+            <a:r>
+              <a:rPr lang="en-US" sz="1400" smtClean="0"/>
+              <a:t>with Metrics</a:t>
+            </a:r>
+            <a:endParaRPr lang="en-US" sz="1400" dirty="0"/>
           </a:p>
         </p:txBody>
       </p:sp>
@@ -10710,6 +10737,13 @@
   <p:clrMapOvr>
     <a:masterClrMapping/>
   </p:clrMapOvr>
+  <p:timing>
+    <p:tnLst>
+      <p:par>
+        <p:cTn id="1" dur="indefinite" restart="never" nodeType="tmRoot"/>
+      </p:par>
+    </p:tnLst>
+  </p:timing>
 </p:sld>
 </file>
 
@@ -10816,6 +10850,499 @@
   <p:clrMapOvr>
     <a:masterClrMapping/>
   </p:clrMapOvr>
+  <p:timing>
+    <p:tnLst>
+      <p:par>
+        <p:cTn id="1" dur="indefinite" restart="never" nodeType="tmRoot">
+          <p:childTnLst>
+            <p:seq concurrent="1" nextAc="seek">
+              <p:cTn id="2" dur="indefinite" nodeType="mainSeq">
+                <p:childTnLst>
+                  <p:par>
+                    <p:cTn id="3" fill="hold">
+                      <p:stCondLst>
+                        <p:cond delay="indefinite"/>
+                      </p:stCondLst>
+                      <p:childTnLst>
+                        <p:par>
+                          <p:cTn id="4" fill="hold">
+                            <p:stCondLst>
+                              <p:cond delay="0"/>
+                            </p:stCondLst>
+                            <p:childTnLst>
+                              <p:par>
+                                <p:cTn id="5" presetID="42" presetClass="entr" presetSubtype="0" fill="hold" grpId="0" nodeType="clickEffect">
+                                  <p:stCondLst>
+                                    <p:cond delay="0"/>
+                                  </p:stCondLst>
+                                  <p:childTnLst>
+                                    <p:set>
+                                      <p:cBhvr>
+                                        <p:cTn id="6" dur="1" fill="hold">
+                                          <p:stCondLst>
+                                            <p:cond delay="0"/>
+                                          </p:stCondLst>
+                                        </p:cTn>
+                                        <p:tgtEl>
+                                          <p:spTgt spid="3">
+                                            <p:txEl>
+                                              <p:pRg st="0" end="0"/>
+                                            </p:txEl>
+                                          </p:spTgt>
+                                        </p:tgtEl>
+                                        <p:attrNameLst>
+                                          <p:attrName>style.visibility</p:attrName>
+                                        </p:attrNameLst>
+                                      </p:cBhvr>
+                                      <p:to>
+                                        <p:strVal val="visible"/>
+                                      </p:to>
+                                    </p:set>
+                                    <p:animEffect transition="in" filter="fade">
+                                      <p:cBhvr>
+                                        <p:cTn id="7" dur="1000"/>
+                                        <p:tgtEl>
+                                          <p:spTgt spid="3">
+                                            <p:txEl>
+                                              <p:pRg st="0" end="0"/>
+                                            </p:txEl>
+                                          </p:spTgt>
+                                        </p:tgtEl>
+                                      </p:cBhvr>
+                                    </p:animEffect>
+                                    <p:anim calcmode="lin" valueType="num">
+                                      <p:cBhvr>
+                                        <p:cTn id="8" dur="1000" fill="hold"/>
+                                        <p:tgtEl>
+                                          <p:spTgt spid="3">
+                                            <p:txEl>
+                                              <p:pRg st="0" end="0"/>
+                                            </p:txEl>
+                                          </p:spTgt>
+                                        </p:tgtEl>
+                                        <p:attrNameLst>
+                                          <p:attrName>ppt_x</p:attrName>
+                                        </p:attrNameLst>
+                                      </p:cBhvr>
+                                      <p:tavLst>
+                                        <p:tav tm="0">
+                                          <p:val>
+                                            <p:strVal val="#ppt_x"/>
+                                          </p:val>
+                                        </p:tav>
+                                        <p:tav tm="100000">
+                                          <p:val>
+                                            <p:strVal val="#ppt_x"/>
+                                          </p:val>
+                                        </p:tav>
+                                      </p:tavLst>
+                                    </p:anim>
+                                    <p:anim calcmode="lin" valueType="num">
+                                      <p:cBhvr>
+                                        <p:cTn id="9" dur="1000" fill="hold"/>
+                                        <p:tgtEl>
+                                          <p:spTgt spid="3">
+                                            <p:txEl>
+                                              <p:pRg st="0" end="0"/>
+                                            </p:txEl>
+                                          </p:spTgt>
+                                        </p:tgtEl>
+                                        <p:attrNameLst>
+                                          <p:attrName>ppt_y</p:attrName>
+                                        </p:attrNameLst>
+                                      </p:cBhvr>
+                                      <p:tavLst>
+                                        <p:tav tm="0">
+                                          <p:val>
+                                            <p:strVal val="#ppt_y+.1"/>
+                                          </p:val>
+                                        </p:tav>
+                                        <p:tav tm="100000">
+                                          <p:val>
+                                            <p:strVal val="#ppt_y"/>
+                                          </p:val>
+                                        </p:tav>
+                                      </p:tavLst>
+                                    </p:anim>
+                                  </p:childTnLst>
+                                </p:cTn>
+                              </p:par>
+                            </p:childTnLst>
+                          </p:cTn>
+                        </p:par>
+                      </p:childTnLst>
+                    </p:cTn>
+                  </p:par>
+                  <p:par>
+                    <p:cTn id="10" fill="hold">
+                      <p:stCondLst>
+                        <p:cond delay="indefinite"/>
+                      </p:stCondLst>
+                      <p:childTnLst>
+                        <p:par>
+                          <p:cTn id="11" fill="hold">
+                            <p:stCondLst>
+                              <p:cond delay="0"/>
+                            </p:stCondLst>
+                            <p:childTnLst>
+                              <p:par>
+                                <p:cTn id="12" presetID="42" presetClass="entr" presetSubtype="0" fill="hold" grpId="0" nodeType="clickEffect">
+                                  <p:stCondLst>
+                                    <p:cond delay="0"/>
+                                  </p:stCondLst>
+                                  <p:childTnLst>
+                                    <p:set>
+                                      <p:cBhvr>
+                                        <p:cTn id="13" dur="1" fill="hold">
+                                          <p:stCondLst>
+                                            <p:cond delay="0"/>
+                                          </p:stCondLst>
+                                        </p:cTn>
+                                        <p:tgtEl>
+                                          <p:spTgt spid="3">
+                                            <p:txEl>
+                                              <p:pRg st="1" end="1"/>
+                                            </p:txEl>
+                                          </p:spTgt>
+                                        </p:tgtEl>
+                                        <p:attrNameLst>
+                                          <p:attrName>style.visibility</p:attrName>
+                                        </p:attrNameLst>
+                                      </p:cBhvr>
+                                      <p:to>
+                                        <p:strVal val="visible"/>
+                                      </p:to>
+                                    </p:set>
+                                    <p:animEffect transition="in" filter="fade">
+                                      <p:cBhvr>
+                                        <p:cTn id="14" dur="1000"/>
+                                        <p:tgtEl>
+                                          <p:spTgt spid="3">
+                                            <p:txEl>
+                                              <p:pRg st="1" end="1"/>
+                                            </p:txEl>
+                                          </p:spTgt>
+                                        </p:tgtEl>
+                                      </p:cBhvr>
+                                    </p:animEffect>
+                                    <p:anim calcmode="lin" valueType="num">
+                                      <p:cBhvr>
+                                        <p:cTn id="15" dur="1000" fill="hold"/>
+                                        <p:tgtEl>
+                                          <p:spTgt spid="3">
+                                            <p:txEl>
+                                              <p:pRg st="1" end="1"/>
+                                            </p:txEl>
+                                          </p:spTgt>
+                                        </p:tgtEl>
+                                        <p:attrNameLst>
+                                          <p:attrName>ppt_x</p:attrName>
+                                        </p:attrNameLst>
+                                      </p:cBhvr>
+                                      <p:tavLst>
+                                        <p:tav tm="0">
+                                          <p:val>
+                                            <p:strVal val="#ppt_x"/>
+                                          </p:val>
+                                        </p:tav>
+                                        <p:tav tm="100000">
+                                          <p:val>
+                                            <p:strVal val="#ppt_x"/>
+                                          </p:val>
+                                        </p:tav>
+                                      </p:tavLst>
+                                    </p:anim>
+                                    <p:anim calcmode="lin" valueType="num">
+                                      <p:cBhvr>
+                                        <p:cTn id="16" dur="1000" fill="hold"/>
+                                        <p:tgtEl>
+                                          <p:spTgt spid="3">
+                                            <p:txEl>
+                                              <p:pRg st="1" end="1"/>
+                                            </p:txEl>
+                                          </p:spTgt>
+                                        </p:tgtEl>
+                                        <p:attrNameLst>
+                                          <p:attrName>ppt_y</p:attrName>
+                                        </p:attrNameLst>
+                                      </p:cBhvr>
+                                      <p:tavLst>
+                                        <p:tav tm="0">
+                                          <p:val>
+                                            <p:strVal val="#ppt_y+.1"/>
+                                          </p:val>
+                                        </p:tav>
+                                        <p:tav tm="100000">
+                                          <p:val>
+                                            <p:strVal val="#ppt_y"/>
+                                          </p:val>
+                                        </p:tav>
+                                      </p:tavLst>
+                                    </p:anim>
+                                  </p:childTnLst>
+                                </p:cTn>
+                              </p:par>
+                            </p:childTnLst>
+                          </p:cTn>
+                        </p:par>
+                      </p:childTnLst>
+                    </p:cTn>
+                  </p:par>
+                  <p:par>
+                    <p:cTn id="17" fill="hold">
+                      <p:stCondLst>
+                        <p:cond delay="indefinite"/>
+                      </p:stCondLst>
+                      <p:childTnLst>
+                        <p:par>
+                          <p:cTn id="18" fill="hold">
+                            <p:stCondLst>
+                              <p:cond delay="0"/>
+                            </p:stCondLst>
+                            <p:childTnLst>
+                              <p:par>
+                                <p:cTn id="19" presetID="42" presetClass="entr" presetSubtype="0" fill="hold" grpId="0" nodeType="clickEffect">
+                                  <p:stCondLst>
+                                    <p:cond delay="0"/>
+                                  </p:stCondLst>
+                                  <p:childTnLst>
+                                    <p:set>
+                                      <p:cBhvr>
+                                        <p:cTn id="20" dur="1" fill="hold">
+                                          <p:stCondLst>
+                                            <p:cond delay="0"/>
+                                          </p:stCondLst>
+                                        </p:cTn>
+                                        <p:tgtEl>
+                                          <p:spTgt spid="3">
+                                            <p:txEl>
+                                              <p:pRg st="2" end="2"/>
+                                            </p:txEl>
+                                          </p:spTgt>
+                                        </p:tgtEl>
+                                        <p:attrNameLst>
+                                          <p:attrName>style.visibility</p:attrName>
+                                        </p:attrNameLst>
+                                      </p:cBhvr>
+                                      <p:to>
+                                        <p:strVal val="visible"/>
+                                      </p:to>
+                                    </p:set>
+                                    <p:animEffect transition="in" filter="fade">
+                                      <p:cBhvr>
+                                        <p:cTn id="21" dur="1000"/>
+                                        <p:tgtEl>
+                                          <p:spTgt spid="3">
+                                            <p:txEl>
+                                              <p:pRg st="2" end="2"/>
+                                            </p:txEl>
+                                          </p:spTgt>
+                                        </p:tgtEl>
+                                      </p:cBhvr>
+                                    </p:animEffect>
+                                    <p:anim calcmode="lin" valueType="num">
+                                      <p:cBhvr>
+                                        <p:cTn id="22" dur="1000" fill="hold"/>
+                                        <p:tgtEl>
+                                          <p:spTgt spid="3">
+                                            <p:txEl>
+                                              <p:pRg st="2" end="2"/>
+                                            </p:txEl>
+                                          </p:spTgt>
+                                        </p:tgtEl>
+                                        <p:attrNameLst>
+                                          <p:attrName>ppt_x</p:attrName>
+                                        </p:attrNameLst>
+                                      </p:cBhvr>
+                                      <p:tavLst>
+                                        <p:tav tm="0">
+                                          <p:val>
+                                            <p:strVal val="#ppt_x"/>
+                                          </p:val>
+                                        </p:tav>
+                                        <p:tav tm="100000">
+                                          <p:val>
+                                            <p:strVal val="#ppt_x"/>
+                                          </p:val>
+                                        </p:tav>
+                                      </p:tavLst>
+                                    </p:anim>
+                                    <p:anim calcmode="lin" valueType="num">
+                                      <p:cBhvr>
+                                        <p:cTn id="23" dur="1000" fill="hold"/>
+                                        <p:tgtEl>
+                                          <p:spTgt spid="3">
+                                            <p:txEl>
+                                              <p:pRg st="2" end="2"/>
+                                            </p:txEl>
+                                          </p:spTgt>
+                                        </p:tgtEl>
+                                        <p:attrNameLst>
+                                          <p:attrName>ppt_y</p:attrName>
+                                        </p:attrNameLst>
+                                      </p:cBhvr>
+                                      <p:tavLst>
+                                        <p:tav tm="0">
+                                          <p:val>
+                                            <p:strVal val="#ppt_y+.1"/>
+                                          </p:val>
+                                        </p:tav>
+                                        <p:tav tm="100000">
+                                          <p:val>
+                                            <p:strVal val="#ppt_y"/>
+                                          </p:val>
+                                        </p:tav>
+                                      </p:tavLst>
+                                    </p:anim>
+                                  </p:childTnLst>
+                                </p:cTn>
+                              </p:par>
+                            </p:childTnLst>
+                          </p:cTn>
+                        </p:par>
+                      </p:childTnLst>
+                    </p:cTn>
+                  </p:par>
+                  <p:par>
+                    <p:cTn id="24" fill="hold">
+                      <p:stCondLst>
+                        <p:cond delay="indefinite"/>
+                      </p:stCondLst>
+                      <p:childTnLst>
+                        <p:par>
+                          <p:cTn id="25" fill="hold">
+                            <p:stCondLst>
+                              <p:cond delay="0"/>
+                            </p:stCondLst>
+                            <p:childTnLst>
+                              <p:par>
+                                <p:cTn id="26" presetID="42" presetClass="entr" presetSubtype="0" fill="hold" grpId="0" nodeType="clickEffect">
+                                  <p:stCondLst>
+                                    <p:cond delay="0"/>
+                                  </p:stCondLst>
+                                  <p:childTnLst>
+                                    <p:set>
+                                      <p:cBhvr>
+                                        <p:cTn id="27" dur="1" fill="hold">
+                                          <p:stCondLst>
+                                            <p:cond delay="0"/>
+                                          </p:stCondLst>
+                                        </p:cTn>
+                                        <p:tgtEl>
+                                          <p:spTgt spid="3">
+                                            <p:txEl>
+                                              <p:pRg st="3" end="3"/>
+                                            </p:txEl>
+                                          </p:spTgt>
+                                        </p:tgtEl>
+                                        <p:attrNameLst>
+                                          <p:attrName>style.visibility</p:attrName>
+                                        </p:attrNameLst>
+                                      </p:cBhvr>
+                                      <p:to>
+                                        <p:strVal val="visible"/>
+                                      </p:to>
+                                    </p:set>
+                                    <p:animEffect transition="in" filter="fade">
+                                      <p:cBhvr>
+                                        <p:cTn id="28" dur="1000"/>
+                                        <p:tgtEl>
+                                          <p:spTgt spid="3">
+                                            <p:txEl>
+                                              <p:pRg st="3" end="3"/>
+                                            </p:txEl>
+                                          </p:spTgt>
+                                        </p:tgtEl>
+                                      </p:cBhvr>
+                                    </p:animEffect>
+                                    <p:anim calcmode="lin" valueType="num">
+                                      <p:cBhvr>
+                                        <p:cTn id="29" dur="1000" fill="hold"/>
+                                        <p:tgtEl>
+                                          <p:spTgt spid="3">
+                                            <p:txEl>
+                                              <p:pRg st="3" end="3"/>
+                                            </p:txEl>
+                                          </p:spTgt>
+                                        </p:tgtEl>
+                                        <p:attrNameLst>
+                                          <p:attrName>ppt_x</p:attrName>
+                                        </p:attrNameLst>
+                                      </p:cBhvr>
+                                      <p:tavLst>
+                                        <p:tav tm="0">
+                                          <p:val>
+                                            <p:strVal val="#ppt_x"/>
+                                          </p:val>
+                                        </p:tav>
+                                        <p:tav tm="100000">
+                                          <p:val>
+                                            <p:strVal val="#ppt_x"/>
+                                          </p:val>
+                                        </p:tav>
+                                      </p:tavLst>
+                                    </p:anim>
+                                    <p:anim calcmode="lin" valueType="num">
+                                      <p:cBhvr>
+                                        <p:cTn id="30" dur="1000" fill="hold"/>
+                                        <p:tgtEl>
+                                          <p:spTgt spid="3">
+                                            <p:txEl>
+                                              <p:pRg st="3" end="3"/>
+                                            </p:txEl>
+                                          </p:spTgt>
+                                        </p:tgtEl>
+                                        <p:attrNameLst>
+                                          <p:attrName>ppt_y</p:attrName>
+                                        </p:attrNameLst>
+                                      </p:cBhvr>
+                                      <p:tavLst>
+                                        <p:tav tm="0">
+                                          <p:val>
+                                            <p:strVal val="#ppt_y+.1"/>
+                                          </p:val>
+                                        </p:tav>
+                                        <p:tav tm="100000">
+                                          <p:val>
+                                            <p:strVal val="#ppt_y"/>
+                                          </p:val>
+                                        </p:tav>
+                                      </p:tavLst>
+                                    </p:anim>
+                                  </p:childTnLst>
+                                </p:cTn>
+                              </p:par>
+                            </p:childTnLst>
+                          </p:cTn>
+                        </p:par>
+                      </p:childTnLst>
+                    </p:cTn>
+                  </p:par>
+                </p:childTnLst>
+              </p:cTn>
+              <p:prevCondLst>
+                <p:cond evt="onPrev" delay="0">
+                  <p:tgtEl>
+                    <p:sldTgt/>
+                  </p:tgtEl>
+                </p:cond>
+              </p:prevCondLst>
+              <p:nextCondLst>
+                <p:cond evt="onNext" delay="0">
+                  <p:tgtEl>
+                    <p:sldTgt/>
+                  </p:tgtEl>
+                </p:cond>
+              </p:nextCondLst>
+            </p:seq>
+          </p:childTnLst>
+        </p:cTn>
+      </p:par>
+    </p:tnLst>
+    <p:bldLst>
+      <p:bldP spid="3" grpId="0" build="p"/>
+    </p:bldLst>
+  </p:timing>
 </p:sld>
 </file>
 
@@ -10920,6 +11447,13 @@
   <p:clrMapOvr>
     <a:masterClrMapping/>
   </p:clrMapOvr>
+  <p:timing>
+    <p:tnLst>
+      <p:par>
+        <p:cTn id="1" dur="indefinite" restart="never" nodeType="tmRoot"/>
+      </p:par>
+    </p:tnLst>
+  </p:timing>
 </p:sld>
 </file>
 
@@ -11099,6 +11633,13 @@
   <p:clrMapOvr>
     <a:masterClrMapping/>
   </p:clrMapOvr>
+  <p:timing>
+    <p:tnLst>
+      <p:par>
+        <p:cTn id="1" dur="indefinite" restart="never" nodeType="tmRoot"/>
+      </p:par>
+    </p:tnLst>
+  </p:timing>
 </p:sld>
 </file>
 
@@ -11190,6 +11731,47 @@
           </a:p>
         </p:txBody>
       </p:sp>
+      <p:pic>
+        <p:nvPicPr>
+          <p:cNvPr id="1026" name="Picture 2" descr="C:\Users\Chris\Downloads\download.png"/>
+          <p:cNvPicPr>
+            <a:picLocks noChangeAspect="1" noChangeArrowheads="1"/>
+          </p:cNvPicPr>
+          <p:nvPr/>
+        </p:nvPicPr>
+        <p:blipFill>
+          <a:blip r:embed="rId2">
+            <a:extLst>
+              <a:ext uri="{28A0092B-C50C-407E-A947-70E740481C1C}">
+                <a14:useLocalDpi xmlns:a14="http://schemas.microsoft.com/office/drawing/2010/main" val="0"/>
+              </a:ext>
+            </a:extLst>
+          </a:blip>
+          <a:srcRect/>
+          <a:stretch>
+            <a:fillRect/>
+          </a:stretch>
+        </p:blipFill>
+        <p:spPr bwMode="auto">
+          <a:xfrm>
+            <a:off x="5751596" y="4063416"/>
+            <a:ext cx="1771650" cy="2581275"/>
+          </a:xfrm>
+          <a:prstGeom prst="rect">
+            <a:avLst/>
+          </a:prstGeom>
+          <a:noFill/>
+          <a:extLst>
+            <a:ext uri="{909E8E84-426E-40DD-AFC4-6F175D3DCCD1}">
+              <a14:hiddenFill xmlns:a14="http://schemas.microsoft.com/office/drawing/2010/main">
+                <a:solidFill>
+                  <a:srgbClr val="FFFFFF"/>
+                </a:solidFill>
+              </a14:hiddenFill>
+            </a:ext>
+          </a:extLst>
+        </p:spPr>
+      </p:pic>
     </p:spTree>
     <p:extLst>
       <p:ext uri="{BB962C8B-B14F-4D97-AF65-F5344CB8AC3E}">
@@ -11500,7 +12082,7 @@
   <a:extraClrSchemeLst/>
   <a:extLst>
     <a:ext uri="{05A4C25C-085E-4340-85A3-A5531E510DB2}">
-      <thm15:themeFamily xmlns:thm15="http://schemas.microsoft.com/office/thememl/2012/main" name="Wisp" id="{7CB32D59-10C0-40DD-B7BD-2E94284A981C}" vid="{24B1A44C-C006-48B2-A4D7-E5549B3D8CD4}"/>
+      <thm15:themeFamily xmlns="" xmlns:thm15="http://schemas.microsoft.com/office/thememl/2012/main" name="Wisp" id="{7CB32D59-10C0-40DD-B7BD-2E94284A981C}" vid="{24B1A44C-C006-48B2-A4D7-E5549B3D8CD4}"/>
     </a:ext>
   </a:extLst>
 </a:theme>

</xml_diff>